<commit_message>
Adicao de novos arquivos
</commit_message>
<xml_diff>
--- a/lista_3_apresentacao.pptx
+++ b/lista_3_apresentacao.pptx
@@ -17,6 +17,13 @@
     <p:sldId id="265" r:id="rId11"/>
     <p:sldId id="266" r:id="rId12"/>
     <p:sldId id="267" r:id="rId13"/>
+    <p:sldId id="268" r:id="rId14"/>
+    <p:sldId id="269" r:id="rId15"/>
+    <p:sldId id="270" r:id="rId16"/>
+    <p:sldId id="271" r:id="rId17"/>
+    <p:sldId id="272" r:id="rId18"/>
+    <p:sldId id="273" r:id="rId19"/>
+    <p:sldId id="274" r:id="rId20"/>
   </p:sldIdLst>
   <p:sldSz cx="9144000" cy="6858000" type="screen4x3"/>
   <p:notesSz cx="6858000" cy="9144000"/>
@@ -3323,7 +3330,15 @@
             </a:r>
             <a:r>
               <a:rPr/>
-              <a:t>gráfico</a:t>
+              <a:t>os</a:t>
+            </a:r>
+            <a:r>
+              <a:rPr/>
+              <a:t> </a:t>
+            </a:r>
+            <a:r>
+              <a:rPr/>
+              <a:t>gráficos</a:t>
             </a:r>
           </a:p>
         </p:txBody>
@@ -3346,7 +3361,7 @@
             <a:pPr lvl="1"/>
             <a:r>
               <a:rPr/>
-              <a:t>Calculando os valores máximos e mínimos das datas a partir de ordem crescente</a:t>
+              <a:t>Criarei uma nova coluna (abv_state) a partir da base de dados (states_and_abbreviations) para usar as abreviação dos nomes dos estados e assim facilitar a visualização dos dados no gráfico.</a:t>
             </a:r>
           </a:p>
           <a:p>
@@ -3357,88 +3372,295 @@
               <a:rPr sz="1800">
                 <a:latin typeface="Courier"/>
               </a:rPr>
-              <a:t>## # A tibble: 1 x 1
-##   constitution_year
-##               &lt;dbl&gt;
-## 1              2004</a:t>
-            </a:r>
-          </a:p>
-          <a:p>
-            <a:pPr lvl="0" marL="1270000" indent="0">
-              <a:buNone/>
-            </a:pPr>
-            <a:r>
-              <a:rPr sz="1800">
-                <a:latin typeface="Courier"/>
-              </a:rPr>
-              <a:t>## # A tibble: 1 x 1
-##   constitution_year
-##               &lt;dbl&gt;
-## 1              2017</a:t>
-            </a:r>
-          </a:p>
-          <a:p>
-            <a:pPr lvl="0" marL="0" indent="0">
-              <a:buNone/>
-            </a:pPr>
-            <a:r>
-              <a:rPr/>
-              <a:t>#Gráfico 1 ## Justificando a escolha do gráfico 1 - Optou-se por utilizar o tipo de gráfico “Line Histogram” pelos seguintes motivos: ** O objetivo é observar a distribuição das constituições ao longo do tempo ** O ano da constituição vigente (constitution_year) é a variável em foco, variável única ** Como os Estados Unidos têm muitos estados, totalizando 50, existem muitos “data points” e por isso optou-se pelo histograma em linha, para evidenciar o pico da promulgação de constituições.</a:t>
-            </a:r>
-          </a:p>
-          <a:p>
-            <a:pPr lvl="0" marL="0" indent="0">
-              <a:spcBef>
-                <a:spcPts val="3000"/>
-              </a:spcBef>
-              <a:buNone/>
-            </a:pPr>
-            <a:r>
-              <a:rPr b="1"/>
-              <a:t>Comentando os códigos do gráfico 1</a:t>
-            </a:r>
-          </a:p>
-          <a:p>
-            <a:pPr lvl="1"/>
-            <a:r>
-              <a:rPr/>
-              <a:t>O gráfico terá as seguintes características:</a:t>
-            </a:r>
-          </a:p>
-          <a:p>
-            <a:pPr lvl="1">
-              <a:buAutoNum type="arabicPeriod"/>
-            </a:pPr>
-            <a:r>
-              <a:rPr/>
-              <a:t>Gemoetria de densidade - para identificar quantas constituições foram promulgadas em cada ano e conseguir visualizar bem a distribuição ao longo do tempo. geom_density()</a:t>
-            </a:r>
-          </a:p>
-          <a:p>
-            <a:pPr lvl="1">
-              <a:buAutoNum type="arabicPeriod"/>
-            </a:pPr>
-            <a:r>
-              <a:rPr/>
-              <a:t>Estética: 1.1 O eixo x será composto pelas datas para que as alterações possam ser bem visualizadas: x=constitution_year 1.1 O eixo y indicará a densidade</a:t>
-            </a:r>
-          </a:p>
-          <a:p>
-            <a:pPr lvl="1">
-              <a:buAutoNum type="arabicPeriod"/>
-            </a:pPr>
-            <a:r>
-              <a:rPr/>
-              <a:t>Tema classic - fundo branco e sem grades para facilitar a visualização</a:t>
-            </a:r>
-          </a:p>
-          <a:p>
-            <a:pPr lvl="1">
-              <a:buAutoNum type="arabicPeriod"/>
-            </a:pPr>
-            <a:r>
-              <a:rPr/>
-              <a:t>Cor de contorno será preta</a:t>
+              <a:t>state_abrev &lt;-</a:t>
+            </a:r>
+            <a:r>
+              <a:rPr sz="1800">
+                <a:solidFill>
+                  <a:srgbClr val="4070A0"/>
+                </a:solidFill>
+                <a:latin typeface="Courier"/>
+              </a:rPr>
+              <a:t> </a:t>
+            </a:r>
+            <a:r>
+              <a:rPr sz="1800" b="1">
+                <a:solidFill>
+                  <a:srgbClr val="007020"/>
+                </a:solidFill>
+                <a:latin typeface="Courier"/>
+              </a:rPr>
+              <a:t>read_excel</a:t>
+            </a:r>
+            <a:r>
+              <a:rPr sz="1800">
+                <a:latin typeface="Courier"/>
+              </a:rPr>
+              <a:t>(</a:t>
+            </a:r>
+            <a:r>
+              <a:rPr sz="1800">
+                <a:solidFill>
+                  <a:srgbClr val="4070A0"/>
+                </a:solidFill>
+                <a:latin typeface="Courier"/>
+              </a:rPr>
+              <a:t>"states_and_abbreviations.xlsx"</a:t>
+            </a:r>
+            <a:r>
+              <a:rPr sz="1800">
+                <a:latin typeface="Courier"/>
+              </a:rPr>
+              <a:t>) </a:t>
+            </a:r>
+            <a:r>
+              <a:rPr sz="1800" i="1">
+                <a:solidFill>
+                  <a:srgbClr val="60A0B0"/>
+                </a:solidFill>
+                <a:latin typeface="Courier"/>
+              </a:rPr>
+              <a:t>#chamando a base de dados para colocar as abreviações </a:t>
+            </a:r>
+            <a:br/>
+            <a:br/>
+            <a:r>
+              <a:rPr sz="1800">
+                <a:latin typeface="Courier"/>
+              </a:rPr>
+              <a:t>state_constitutions_word_count &lt;-</a:t>
+            </a:r>
+            <a:r>
+              <a:rPr sz="1800">
+                <a:solidFill>
+                  <a:srgbClr val="4070A0"/>
+                </a:solidFill>
+                <a:latin typeface="Courier"/>
+              </a:rPr>
+              <a:t> </a:t>
+            </a:r>
+            <a:r>
+              <a:rPr sz="1800">
+                <a:latin typeface="Courier"/>
+              </a:rPr>
+              <a:t>state_constitutions_word_count </a:t>
+            </a:r>
+            <a:r>
+              <a:rPr sz="1800">
+                <a:solidFill>
+                  <a:srgbClr val="666666"/>
+                </a:solidFill>
+                <a:latin typeface="Courier"/>
+              </a:rPr>
+              <a:t>%&gt;%</a:t>
+            </a:r>
+            <a:r>
+              <a:rPr sz="1800">
+                <a:solidFill>
+                  <a:srgbClr val="4070A0"/>
+                </a:solidFill>
+                <a:latin typeface="Courier"/>
+              </a:rPr>
+              <a:t> </a:t>
+            </a:r>
+            <a:r>
+              <a:rPr sz="1800" b="1">
+                <a:solidFill>
+                  <a:srgbClr val="007020"/>
+                </a:solidFill>
+                <a:latin typeface="Courier"/>
+              </a:rPr>
+              <a:t>arrange</a:t>
+            </a:r>
+            <a:r>
+              <a:rPr sz="1800">
+                <a:latin typeface="Courier"/>
+              </a:rPr>
+              <a:t>(state) </a:t>
+            </a:r>
+            <a:r>
+              <a:rPr sz="1800" i="1">
+                <a:solidFill>
+                  <a:srgbClr val="60A0B0"/>
+                </a:solidFill>
+                <a:latin typeface="Courier"/>
+              </a:rPr>
+              <a:t>#ordenando por nome do Estado a primeira bases de dados para poder juntar</a:t>
+            </a:r>
+            <a:br/>
+            <a:br/>
+            <a:r>
+              <a:rPr sz="1800">
+                <a:latin typeface="Courier"/>
+              </a:rPr>
+              <a:t>state_constitutions_word_count &lt;-</a:t>
+            </a:r>
+            <a:r>
+              <a:rPr sz="1800">
+                <a:solidFill>
+                  <a:srgbClr val="4070A0"/>
+                </a:solidFill>
+                <a:latin typeface="Courier"/>
+              </a:rPr>
+              <a:t> </a:t>
+            </a:r>
+            <a:r>
+              <a:rPr sz="1800">
+                <a:latin typeface="Courier"/>
+              </a:rPr>
+              <a:t>state_constitutions_word_count </a:t>
+            </a:r>
+            <a:r>
+              <a:rPr sz="1800">
+                <a:solidFill>
+                  <a:srgbClr val="666666"/>
+                </a:solidFill>
+                <a:latin typeface="Courier"/>
+              </a:rPr>
+              <a:t>%&gt;%</a:t>
+            </a:r>
+            <a:r>
+              <a:rPr sz="1800">
+                <a:solidFill>
+                  <a:srgbClr val="4070A0"/>
+                </a:solidFill>
+                <a:latin typeface="Courier"/>
+              </a:rPr>
+              <a:t> </a:t>
+            </a:r>
+            <a:r>
+              <a:rPr sz="1800" b="1">
+                <a:solidFill>
+                  <a:srgbClr val="007020"/>
+                </a:solidFill>
+                <a:latin typeface="Courier"/>
+              </a:rPr>
+              <a:t>left_join</a:t>
+            </a:r>
+            <a:r>
+              <a:rPr sz="1800">
+                <a:latin typeface="Courier"/>
+              </a:rPr>
+              <a:t>(state_abrev, </a:t>
+            </a:r>
+            <a:r>
+              <a:rPr sz="1800">
+                <a:solidFill>
+                  <a:srgbClr val="902000"/>
+                </a:solidFill>
+                <a:latin typeface="Courier"/>
+              </a:rPr>
+              <a:t>by =</a:t>
+            </a:r>
+            <a:r>
+              <a:rPr sz="1800">
+                <a:latin typeface="Courier"/>
+              </a:rPr>
+              <a:t> </a:t>
+            </a:r>
+            <a:r>
+              <a:rPr sz="1800">
+                <a:solidFill>
+                  <a:srgbClr val="4070A0"/>
+                </a:solidFill>
+                <a:latin typeface="Courier"/>
+              </a:rPr>
+              <a:t>"state"</a:t>
+            </a:r>
+            <a:r>
+              <a:rPr sz="1800">
+                <a:latin typeface="Courier"/>
+              </a:rPr>
+              <a:t>)</a:t>
+            </a:r>
+            <a:r>
+              <a:rPr sz="1800" i="1">
+                <a:solidFill>
+                  <a:srgbClr val="60A0B0"/>
+                </a:solidFill>
+                <a:latin typeface="Courier"/>
+              </a:rPr>
+              <a:t>#juntando as bases de dados a partir da coluna "states"</a:t>
+            </a:r>
+            <a:br/>
+            <a:br/>
+            <a:r>
+              <a:rPr sz="1800">
+                <a:latin typeface="Courier"/>
+              </a:rPr>
+              <a:t>state_constitutions_word_count &lt;-</a:t>
+            </a:r>
+            <a:r>
+              <a:rPr sz="1800">
+                <a:solidFill>
+                  <a:srgbClr val="4070A0"/>
+                </a:solidFill>
+                <a:latin typeface="Courier"/>
+              </a:rPr>
+              <a:t> </a:t>
+            </a:r>
+            <a:r>
+              <a:rPr sz="1800">
+                <a:latin typeface="Courier"/>
+              </a:rPr>
+              <a:t>state_constitutions_word_count </a:t>
+            </a:r>
+            <a:r>
+              <a:rPr sz="1800">
+                <a:solidFill>
+                  <a:srgbClr val="666666"/>
+                </a:solidFill>
+                <a:latin typeface="Courier"/>
+              </a:rPr>
+              <a:t>%&gt;%</a:t>
+            </a:r>
+            <a:r>
+              <a:rPr sz="1800">
+                <a:solidFill>
+                  <a:srgbClr val="4070A0"/>
+                </a:solidFill>
+                <a:latin typeface="Courier"/>
+              </a:rPr>
+              <a:t> </a:t>
+            </a:r>
+            <a:r>
+              <a:rPr sz="1800" b="1">
+                <a:solidFill>
+                  <a:srgbClr val="007020"/>
+                </a:solidFill>
+                <a:latin typeface="Courier"/>
+              </a:rPr>
+              <a:t>rename</a:t>
+            </a:r>
+            <a:r>
+              <a:rPr sz="1800">
+                <a:latin typeface="Courier"/>
+              </a:rPr>
+              <a:t> (</a:t>
+            </a:r>
+            <a:r>
+              <a:rPr sz="1800">
+                <a:solidFill>
+                  <a:srgbClr val="902000"/>
+                </a:solidFill>
+                <a:latin typeface="Courier"/>
+              </a:rPr>
+              <a:t>abv_state=</a:t>
+            </a:r>
+            <a:r>
+              <a:rPr sz="1800">
+                <a:latin typeface="Courier"/>
+              </a:rPr>
+              <a:t>abbreviation) </a:t>
+            </a:r>
+            <a:r>
+              <a:rPr sz="1800" i="1">
+                <a:solidFill>
+                  <a:srgbClr val="60A0B0"/>
+                </a:solidFill>
+                <a:latin typeface="Courier"/>
+              </a:rPr>
+              <a:t>#renomeando o nome da variável que indica a abreviação dos nomes dos estados</a:t>
             </a:r>
           </a:p>
         </p:txBody>
@@ -3485,114 +3707,362 @@
             </a:pPr>
             <a:r>
               <a:rPr/>
-              <a:t>Gráfico</a:t>
-            </a:r>
-            <a:r>
-              <a:rPr/>
-              <a:t> </a:t>
-            </a:r>
-            <a:r>
-              <a:rPr/>
+              <a:t>Preparando</a:t>
+            </a:r>
+            <a:r>
+              <a:rPr/>
+              <a:t> </a:t>
+            </a:r>
+            <a:r>
+              <a:rPr/>
+              <a:t>os</a:t>
+            </a:r>
+            <a:r>
+              <a:rPr/>
+              <a:t> </a:t>
+            </a:r>
+            <a:r>
+              <a:rPr/>
+              <a:t>dados</a:t>
+            </a:r>
+            <a:r>
+              <a:rPr/>
+              <a:t> </a:t>
+            </a:r>
+            <a:r>
+              <a:rPr/>
+              <a:t>para</a:t>
+            </a:r>
+            <a:r>
+              <a:rPr/>
+              <a:t> </a:t>
+            </a:r>
+            <a:r>
+              <a:rPr/>
+              <a:t>gráfico</a:t>
+            </a:r>
+          </a:p>
+        </p:txBody>
+      </p:sp>
+      <p:sp>
+        <p:nvSpPr>
+          <p:cNvPr id="3" name="Content Placeholder 2"/>
+          <p:cNvSpPr>
+            <a:spLocks noGrp="1"/>
+          </p:cNvSpPr>
+          <p:nvPr>
+            <p:ph idx="1"/>
+          </p:nvPr>
+        </p:nvSpPr>
+        <p:spPr/>
+        <p:txBody>
+          <a:bodyPr/>
+          <a:lstStyle/>
+          <a:p>
+            <a:pPr lvl="1"/>
+            <a:r>
+              <a:rPr/>
+              <a:t>Calculando os valores máximos e mínimos das datas a partir de ordem crescente</a:t>
+            </a:r>
+          </a:p>
+          <a:p>
+            <a:pPr lvl="0" marL="1270000" indent="0">
+              <a:buNone/>
+            </a:pPr>
+            <a:r>
+              <a:rPr sz="1800">
+                <a:latin typeface="Courier"/>
+              </a:rPr>
+              <a:t>state_constitutions_word_count &lt;-</a:t>
+            </a:r>
+            <a:r>
+              <a:rPr sz="1800">
+                <a:solidFill>
+                  <a:srgbClr val="4070A0"/>
+                </a:solidFill>
+                <a:latin typeface="Courier"/>
+              </a:rPr>
+              <a:t> </a:t>
+            </a:r>
+            <a:r>
+              <a:rPr sz="1800">
+                <a:latin typeface="Courier"/>
+              </a:rPr>
+              <a:t>state_constitutions_word_count </a:t>
+            </a:r>
+            <a:r>
+              <a:rPr sz="1800">
+                <a:solidFill>
+                  <a:srgbClr val="666666"/>
+                </a:solidFill>
+                <a:latin typeface="Courier"/>
+              </a:rPr>
+              <a:t>%&gt;%</a:t>
+            </a:r>
+            <a:r>
+              <a:rPr sz="1800">
+                <a:solidFill>
+                  <a:srgbClr val="4070A0"/>
+                </a:solidFill>
+                <a:latin typeface="Courier"/>
+              </a:rPr>
+              <a:t> </a:t>
+            </a:r>
+            <a:r>
+              <a:rPr sz="1800" b="1">
+                <a:solidFill>
+                  <a:srgbClr val="007020"/>
+                </a:solidFill>
+                <a:latin typeface="Courier"/>
+              </a:rPr>
+              <a:t>arrange</a:t>
+            </a:r>
+            <a:r>
+              <a:rPr sz="1800">
+                <a:latin typeface="Courier"/>
+              </a:rPr>
+              <a:t>(constitution_year) </a:t>
+            </a:r>
+            <a:r>
+              <a:rPr sz="1800" i="1">
+                <a:solidFill>
+                  <a:srgbClr val="60A0B0"/>
+                </a:solidFill>
+                <a:latin typeface="Courier"/>
+              </a:rPr>
+              <a:t>#ordenando em ordem crescente da mais antiga à mais nova constituição</a:t>
+            </a:r>
+            <a:br/>
+            <a:br/>
+            <a:r>
+              <a:rPr sz="1800">
+                <a:latin typeface="Courier"/>
+              </a:rPr>
+              <a:t>state_constitutions_word_count </a:t>
+            </a:r>
+            <a:r>
+              <a:rPr sz="1800">
+                <a:solidFill>
+                  <a:srgbClr val="666666"/>
+                </a:solidFill>
+                <a:latin typeface="Courier"/>
+              </a:rPr>
+              <a:t>%&gt;%</a:t>
+            </a:r>
+            <a:r>
+              <a:rPr sz="1800">
+                <a:solidFill>
+                  <a:srgbClr val="4070A0"/>
+                </a:solidFill>
+                <a:latin typeface="Courier"/>
+              </a:rPr>
+              <a:t> </a:t>
+            </a:r>
+            <a:r>
+              <a:rPr sz="1800" b="1">
+                <a:solidFill>
+                  <a:srgbClr val="007020"/>
+                </a:solidFill>
+                <a:latin typeface="Courier"/>
+              </a:rPr>
+              <a:t>select</a:t>
+            </a:r>
+            <a:r>
+              <a:rPr sz="1800">
+                <a:latin typeface="Courier"/>
+              </a:rPr>
+              <a:t>(constitution_year) </a:t>
+            </a:r>
+            <a:r>
+              <a:rPr sz="1800">
+                <a:solidFill>
+                  <a:srgbClr val="666666"/>
+                </a:solidFill>
+                <a:latin typeface="Courier"/>
+              </a:rPr>
+              <a:t>%&gt;%</a:t>
+            </a:r>
+            <a:r>
+              <a:rPr sz="1800">
+                <a:solidFill>
+                  <a:srgbClr val="4070A0"/>
+                </a:solidFill>
+                <a:latin typeface="Courier"/>
+              </a:rPr>
+              <a:t> </a:t>
+            </a:r>
+            <a:r>
+              <a:rPr sz="1800" b="1">
+                <a:solidFill>
+                  <a:srgbClr val="007020"/>
+                </a:solidFill>
+                <a:latin typeface="Courier"/>
+              </a:rPr>
+              <a:t>head</a:t>
+            </a:r>
+            <a:r>
+              <a:rPr sz="1800">
+                <a:latin typeface="Courier"/>
+              </a:rPr>
+              <a:t>(</a:t>
+            </a:r>
+            <a:r>
+              <a:rPr sz="1800">
+                <a:solidFill>
+                  <a:srgbClr val="40A070"/>
+                </a:solidFill>
+                <a:latin typeface="Courier"/>
+              </a:rPr>
               <a:t>1</a:t>
             </a:r>
-          </a:p>
-        </p:txBody>
-      </p:sp>
-      <p:sp>
-        <p:nvSpPr>
-          <p:cNvPr id="3" name="Content Placeholder 2"/>
-          <p:cNvSpPr>
-            <a:spLocks noGrp="1"/>
-          </p:cNvSpPr>
-          <p:nvPr>
-            <p:ph idx="1"/>
-          </p:nvPr>
-        </p:nvSpPr>
-        <p:spPr/>
-        <p:txBody>
-          <a:bodyPr/>
-          <a:lstStyle/>
-          <a:p>
-            <a:pPr lvl="0" marL="0" indent="0">
+            <a:r>
+              <a:rPr sz="1800">
+                <a:latin typeface="Courier"/>
+              </a:rPr>
+              <a:t>) </a:t>
+            </a:r>
+            <a:r>
+              <a:rPr sz="1800" i="1">
+                <a:solidFill>
+                  <a:srgbClr val="60A0B0"/>
+                </a:solidFill>
+                <a:latin typeface="Courier"/>
+              </a:rPr>
+              <a:t>#acessando a data mais antiga das constituições  R: 2004</a:t>
+            </a:r>
+          </a:p>
+          <a:p>
+            <a:pPr lvl="0" marL="1270000" indent="0">
               <a:buNone/>
             </a:pPr>
             <a:r>
-              <a:rPr/>
-              <a:t>#Gráfico 2 ## Justificando a escolha do gráfico 2 - Optou-se por utilizar o tipo de gráfico de pontos (scatter chart) pelos seguintes motivos: ** O objetivo é observar a distribuição do número de palavras nas constituições de cada estado ** Temos duas variáveis em foco - total_word e state - para evidenciar a distribuição de palavras nas constituições dos Estados</a:t>
-            </a:r>
-          </a:p>
-          <a:p>
-            <a:pPr lvl="0" marL="0" indent="0">
-              <a:spcBef>
-                <a:spcPts val="3000"/>
-              </a:spcBef>
+              <a:rPr sz="1800">
+                <a:latin typeface="Courier"/>
+              </a:rPr>
+              <a:t>## # A tibble: 1 x 1
+##   constitution_year
+##               &lt;dbl&gt;
+## 1              2004</a:t>
+            </a:r>
+          </a:p>
+          <a:p>
+            <a:pPr lvl="0" marL="1270000" indent="0">
               <a:buNone/>
             </a:pPr>
             <a:r>
-              <a:rPr b="1"/>
-              <a:t>Manipulando os dados para o gráfico 2</a:t>
-            </a:r>
-          </a:p>
-          <a:p>
-            <a:pPr lvl="1"/>
-            <a:r>
-              <a:rPr/>
-              <a:t>Ordenando a partir da ordem crescente de palavras para facilitar uma visualização linear no gráfico</a:t>
-            </a:r>
-          </a:p>
-          <a:p>
-            <a:pPr lvl="0" marL="0" indent="0">
-              <a:spcBef>
-                <a:spcPts val="3000"/>
-              </a:spcBef>
+              <a:rPr sz="1800">
+                <a:latin typeface="Courier"/>
+              </a:rPr>
+              <a:t>state_constitutions_word_count </a:t>
+            </a:r>
+            <a:r>
+              <a:rPr sz="1800">
+                <a:solidFill>
+                  <a:srgbClr val="666666"/>
+                </a:solidFill>
+                <a:latin typeface="Courier"/>
+              </a:rPr>
+              <a:t>%&gt;%</a:t>
+            </a:r>
+            <a:r>
+              <a:rPr sz="1800">
+                <a:solidFill>
+                  <a:srgbClr val="4070A0"/>
+                </a:solidFill>
+                <a:latin typeface="Courier"/>
+              </a:rPr>
+              <a:t> </a:t>
+            </a:r>
+            <a:r>
+              <a:rPr sz="1800" b="1">
+                <a:solidFill>
+                  <a:srgbClr val="007020"/>
+                </a:solidFill>
+                <a:latin typeface="Courier"/>
+              </a:rPr>
+              <a:t>select</a:t>
+            </a:r>
+            <a:r>
+              <a:rPr sz="1800">
+                <a:latin typeface="Courier"/>
+              </a:rPr>
+              <a:t>(constitution_year) </a:t>
+            </a:r>
+            <a:r>
+              <a:rPr sz="1800">
+                <a:solidFill>
+                  <a:srgbClr val="666666"/>
+                </a:solidFill>
+                <a:latin typeface="Courier"/>
+              </a:rPr>
+              <a:t>%&gt;%</a:t>
+            </a:r>
+            <a:r>
+              <a:rPr sz="1800">
+                <a:solidFill>
+                  <a:srgbClr val="4070A0"/>
+                </a:solidFill>
+                <a:latin typeface="Courier"/>
+              </a:rPr>
+              <a:t> </a:t>
+            </a:r>
+            <a:r>
+              <a:rPr sz="1800" b="1">
+                <a:solidFill>
+                  <a:srgbClr val="007020"/>
+                </a:solidFill>
+                <a:latin typeface="Courier"/>
+              </a:rPr>
+              <a:t>tail</a:t>
+            </a:r>
+            <a:r>
+              <a:rPr sz="1800">
+                <a:latin typeface="Courier"/>
+              </a:rPr>
+              <a:t>(</a:t>
+            </a:r>
+            <a:r>
+              <a:rPr sz="1800">
+                <a:solidFill>
+                  <a:srgbClr val="40A070"/>
+                </a:solidFill>
+                <a:latin typeface="Courier"/>
+              </a:rPr>
+              <a:t>1</a:t>
+            </a:r>
+            <a:r>
+              <a:rPr sz="1800">
+                <a:latin typeface="Courier"/>
+              </a:rPr>
+              <a:t>)</a:t>
+            </a:r>
+          </a:p>
+          <a:p>
+            <a:pPr lvl="0" marL="1270000" indent="0">
               <a:buNone/>
             </a:pPr>
             <a:r>
-              <a:rPr b="1"/>
-              <a:t>Comentando os códigos do gráfico 2</a:t>
-            </a:r>
-          </a:p>
-          <a:p>
-            <a:pPr lvl="1"/>
-            <a:r>
-              <a:rPr/>
-              <a:t>O gráfico terá as seguintes características:</a:t>
-            </a:r>
-          </a:p>
-          <a:p>
-            <a:pPr lvl="1">
-              <a:buAutoNum type="arabicPeriod"/>
+              <a:rPr sz="1800">
+                <a:latin typeface="Courier"/>
+              </a:rPr>
+              <a:t>## # A tibble: 1 x 1
+##   constitution_year
+##               &lt;dbl&gt;
+## 1              2017</a:t>
+            </a:r>
+          </a:p>
+          <a:p>
+            <a:pPr lvl="0" marL="1270000" indent="0">
+              <a:buNone/>
             </a:pPr>
             <a:r>
-              <a:rPr/>
-              <a:t>Gemoetria de pontos - para identificar o número de palavras em cada constituição a partir dos Estados. geom_point()</a:t>
-            </a:r>
-          </a:p>
-          <a:p>
-            <a:pPr lvl="1">
-              <a:buAutoNum type="arabicPeriod"/>
-            </a:pPr>
-            <a:r>
-              <a:rPr/>
-              <a:t>Estética: 1.1 O eixo x será composto pelas abreviações dos nomes dos estados 1.1 O eixo y indicará o total de palavras na constituição daquele Estado. Optou-se por essa dinâmica para possibilitar que a variação entre o número de palavras nas constituições seja comunicado</a:t>
-            </a:r>
-          </a:p>
-          <a:p>
-            <a:pPr lvl="1">
-              <a:buAutoNum type="arabicPeriod"/>
-            </a:pPr>
-            <a:r>
-              <a:rPr/>
-              <a:t>Tema classic - fundo branco e sem grades para facilitar a visualização</a:t>
-            </a:r>
-          </a:p>
-          <a:p>
-            <a:pPr lvl="1">
-              <a:buAutoNum type="arabicPeriod"/>
-            </a:pPr>
-            <a:r>
-              <a:rPr/>
-              <a:t>Cor de contorno será preta</a:t>
+              <a:rPr sz="1800" i="1">
+                <a:solidFill>
+                  <a:srgbClr val="60A0B0"/>
+                </a:solidFill>
+                <a:latin typeface="Courier"/>
+              </a:rPr>
+              <a:t>#acessando a data mais recenteas constituições R: 2017</a:t>
             </a:r>
           </a:p>
         </p:txBody>
@@ -3647,11 +4117,1557 @@
             </a:r>
             <a:r>
               <a:rPr/>
+              <a:t>1</a:t>
+            </a:r>
+          </a:p>
+        </p:txBody>
+      </p:sp>
+      <p:sp>
+        <p:nvSpPr>
+          <p:cNvPr id="3" name="Content Placeholder 2"/>
+          <p:cNvSpPr>
+            <a:spLocks noGrp="1"/>
+          </p:cNvSpPr>
+          <p:nvPr>
+            <p:ph idx="1"/>
+          </p:nvPr>
+        </p:nvSpPr>
+        <p:spPr/>
+        <p:txBody>
+          <a:bodyPr/>
+          <a:lstStyle/>
+          <a:p>
+            <a:pPr lvl="0" marL="0" indent="0">
+              <a:spcBef>
+                <a:spcPts val="3000"/>
+              </a:spcBef>
+              <a:buNone/>
+            </a:pPr>
+            <a:r>
+              <a:rPr b="1"/>
+              <a:t>Justificando a escolha do gráfico 1</a:t>
+            </a:r>
+          </a:p>
+          <a:p>
+            <a:pPr lvl="1"/>
+            <a:r>
+              <a:rPr/>
+              <a:t>Optou-se por utilizar o tipo de gráfico “Line Histogram” pelos seguintes motivos: ** O objetivo é observar a distribuição das constituições ao longo do tempo ** O ano da constituição vigente (constitution_year) é a variável em foco, variável única ** Como os Estados Unidos têm muitos estados, totalizando 50, existem muitos “data points” e por isso optou-se pelo histograma em linha, para evidenciar o pico da promulgação de constituições.</a:t>
+            </a:r>
+          </a:p>
+          <a:p>
+            <a:pPr lvl="0" marL="0" indent="0">
+              <a:spcBef>
+                <a:spcPts val="3000"/>
+              </a:spcBef>
+              <a:buNone/>
+            </a:pPr>
+            <a:r>
+              <a:rPr b="1"/>
+              <a:t>Comentando os códigos do gráfico 1</a:t>
+            </a:r>
+          </a:p>
+          <a:p>
+            <a:pPr lvl="1"/>
+            <a:r>
+              <a:rPr/>
+              <a:t>O gráfico terá as seguintes características:</a:t>
+            </a:r>
+          </a:p>
+          <a:p>
+            <a:pPr lvl="1">
+              <a:buAutoNum type="arabicPeriod"/>
+            </a:pPr>
+            <a:r>
+              <a:rPr/>
+              <a:t>Gemoetria de densidade - para identificar quantas constituições foram promulgadas em cada ano e conseguir visualizar bem a distribuição ao longo do tempo. geom_density()</a:t>
+            </a:r>
+          </a:p>
+          <a:p>
+            <a:pPr lvl="1">
+              <a:buAutoNum type="arabicPeriod"/>
+            </a:pPr>
+            <a:r>
+              <a:rPr/>
+              <a:t>Estética: 1.1 O eixo x será composto pelas datas para que as alterações possam ser bem visualizadas: x=constitution_year 1.1 O eixo y indicará a densidade</a:t>
+            </a:r>
+          </a:p>
+          <a:p>
+            <a:pPr lvl="1">
+              <a:buAutoNum type="arabicPeriod"/>
+            </a:pPr>
+            <a:r>
+              <a:rPr/>
+              <a:t>Tema classic - fundo branco e sem grades para facilitar a visualização</a:t>
+            </a:r>
+          </a:p>
+          <a:p>
+            <a:pPr lvl="1">
+              <a:buAutoNum type="arabicPeriod"/>
+            </a:pPr>
+            <a:r>
+              <a:rPr/>
+              <a:t>Cor de contorno será preta</a:t>
+            </a:r>
+          </a:p>
+        </p:txBody>
+      </p:sp>
+    </p:spTree>
+  </p:cSld>
+</p:sld>
+</file>
+
+<file path=ppt/slides/slide13.xml><?xml version="1.0" encoding="utf-8"?>
+<p:sld xmlns:a="http://schemas.openxmlformats.org/drawingml/2006/main" xmlns:r="http://schemas.openxmlformats.org/officeDocument/2006/relationships" xmlns:p="http://schemas.openxmlformats.org/presentationml/2006/main">
+  <p:cSld>
+    <p:spTree>
+      <p:nvGrpSpPr>
+        <p:cNvPr id="1" name=""/>
+        <p:cNvGrpSpPr/>
+        <p:nvPr/>
+      </p:nvGrpSpPr>
+      <p:grpSpPr>
+        <a:xfrm>
+          <a:off x="0" y="0"/>
+          <a:ext cx="0" cy="0"/>
+          <a:chOff x="0" y="0"/>
+          <a:chExt cx="0" cy="0"/>
+        </a:xfrm>
+      </p:grpSpPr>
+      <p:sp>
+        <p:nvSpPr>
+          <p:cNvPr id="2" name="Title 1"/>
+          <p:cNvSpPr>
+            <a:spLocks noGrp="1"/>
+          </p:cNvSpPr>
+          <p:nvPr>
+            <p:ph type="title"/>
+          </p:nvPr>
+        </p:nvSpPr>
+        <p:spPr/>
+        <p:txBody>
+          <a:bodyPr/>
+          <a:lstStyle/>
+          <a:p>
+            <a:pPr lvl="0" marL="0" indent="0">
+              <a:buNone/>
+            </a:pPr>
+            <a:r>
+              <a:rPr/>
+              <a:t>Gráfico</a:t>
+            </a:r>
+            <a:r>
+              <a:rPr/>
+              <a:t> </a:t>
+            </a:r>
+            <a:r>
+              <a:rPr/>
+              <a:t>1</a:t>
+            </a:r>
+          </a:p>
+        </p:txBody>
+      </p:sp>
+      <p:sp>
+        <p:nvSpPr>
+          <p:cNvPr id="3" name="Content Placeholder 2"/>
+          <p:cNvSpPr>
+            <a:spLocks noGrp="1"/>
+          </p:cNvSpPr>
+          <p:nvPr>
+            <p:ph idx="1"/>
+          </p:nvPr>
+        </p:nvSpPr>
+        <p:spPr/>
+        <p:txBody>
+          <a:bodyPr/>
+          <a:lstStyle/>
+          <a:p>
+            <a:pPr lvl="0" marL="1270000" indent="0">
+              <a:buNone/>
+            </a:pPr>
+            <a:r>
+              <a:rPr sz="1800">
+                <a:latin typeface="Courier"/>
+              </a:rPr>
+              <a:t>grafico1 &lt;-</a:t>
+            </a:r>
+            <a:r>
+              <a:rPr sz="1800">
+                <a:solidFill>
+                  <a:srgbClr val="4070A0"/>
+                </a:solidFill>
+                <a:latin typeface="Courier"/>
+              </a:rPr>
+              <a:t> </a:t>
+            </a:r>
+            <a:r>
+              <a:rPr sz="1800">
+                <a:latin typeface="Courier"/>
+              </a:rPr>
+              <a:t>state_constitutions_word_count </a:t>
+            </a:r>
+            <a:r>
+              <a:rPr sz="1800">
+                <a:solidFill>
+                  <a:srgbClr val="666666"/>
+                </a:solidFill>
+                <a:latin typeface="Courier"/>
+              </a:rPr>
+              <a:t>%&gt;%</a:t>
+            </a:r>
+            <a:r>
+              <a:rPr sz="1800">
+                <a:solidFill>
+                  <a:srgbClr val="4070A0"/>
+                </a:solidFill>
+                <a:latin typeface="Courier"/>
+              </a:rPr>
+              <a:t> </a:t>
+            </a:r>
+            <a:r>
+              <a:rPr sz="1800" b="1">
+                <a:solidFill>
+                  <a:srgbClr val="007020"/>
+                </a:solidFill>
+                <a:latin typeface="Courier"/>
+              </a:rPr>
+              <a:t>ggplot</a:t>
+            </a:r>
+            <a:r>
+              <a:rPr sz="1800">
+                <a:latin typeface="Courier"/>
+              </a:rPr>
+              <a:t>(</a:t>
+            </a:r>
+            <a:r>
+              <a:rPr sz="1800" b="1">
+                <a:solidFill>
+                  <a:srgbClr val="007020"/>
+                </a:solidFill>
+                <a:latin typeface="Courier"/>
+              </a:rPr>
+              <a:t>aes</a:t>
+            </a:r>
+            <a:r>
+              <a:rPr sz="1800">
+                <a:latin typeface="Courier"/>
+              </a:rPr>
+              <a:t>(</a:t>
+            </a:r>
+            <a:r>
+              <a:rPr sz="1800">
+                <a:solidFill>
+                  <a:srgbClr val="902000"/>
+                </a:solidFill>
+                <a:latin typeface="Courier"/>
+              </a:rPr>
+              <a:t>x=</a:t>
+            </a:r>
+            <a:r>
+              <a:rPr sz="1800">
+                <a:latin typeface="Courier"/>
+              </a:rPr>
+              <a:t>constitution_year)) </a:t>
+            </a:r>
+            <a:r>
+              <a:rPr sz="1800">
+                <a:solidFill>
+                  <a:srgbClr val="666666"/>
+                </a:solidFill>
+                <a:latin typeface="Courier"/>
+              </a:rPr>
+              <a:t>+</a:t>
+            </a:r>
+            <a:r>
+              <a:rPr sz="1800" i="1">
+                <a:solidFill>
+                  <a:srgbClr val="60A0B0"/>
+                </a:solidFill>
+                <a:latin typeface="Courier"/>
+              </a:rPr>
+              <a:t># estabelecendo o eixo x - univa variavel que será ano</a:t>
+            </a:r>
+            <a:br/>
+            <a:r>
+              <a:rPr sz="1800">
+                <a:solidFill>
+                  <a:srgbClr val="4070A0"/>
+                </a:solidFill>
+                <a:latin typeface="Courier"/>
+              </a:rPr>
+              <a:t>  </a:t>
+            </a:r>
+            <a:r>
+              <a:rPr sz="1800" b="1">
+                <a:solidFill>
+                  <a:srgbClr val="007020"/>
+                </a:solidFill>
+                <a:latin typeface="Courier"/>
+              </a:rPr>
+              <a:t>geom_density</a:t>
+            </a:r>
+            <a:r>
+              <a:rPr sz="1800">
+                <a:latin typeface="Courier"/>
+              </a:rPr>
+              <a:t>(</a:t>
+            </a:r>
+            <a:r>
+              <a:rPr sz="1800">
+                <a:solidFill>
+                  <a:srgbClr val="902000"/>
+                </a:solidFill>
+                <a:latin typeface="Courier"/>
+              </a:rPr>
+              <a:t>color=</a:t>
+            </a:r>
+            <a:r>
+              <a:rPr sz="1800">
+                <a:solidFill>
+                  <a:srgbClr val="4070A0"/>
+                </a:solidFill>
+                <a:latin typeface="Courier"/>
+              </a:rPr>
+              <a:t>"black"</a:t>
+            </a:r>
+            <a:r>
+              <a:rPr sz="1800">
+                <a:latin typeface="Courier"/>
+              </a:rPr>
+              <a:t>, </a:t>
+            </a:r>
+            <a:r>
+              <a:rPr sz="1800">
+                <a:solidFill>
+                  <a:srgbClr val="902000"/>
+                </a:solidFill>
+                <a:latin typeface="Courier"/>
+              </a:rPr>
+              <a:t>size=</a:t>
+            </a:r>
+            <a:r>
+              <a:rPr sz="1800">
+                <a:solidFill>
+                  <a:srgbClr val="40A070"/>
+                </a:solidFill>
+                <a:latin typeface="Courier"/>
+              </a:rPr>
+              <a:t>1</a:t>
+            </a:r>
+            <a:r>
+              <a:rPr sz="1800">
+                <a:latin typeface="Courier"/>
+              </a:rPr>
+              <a:t>)</a:t>
+            </a:r>
+            <a:r>
+              <a:rPr sz="1800">
+                <a:solidFill>
+                  <a:srgbClr val="666666"/>
+                </a:solidFill>
+                <a:latin typeface="Courier"/>
+              </a:rPr>
+              <a:t>+</a:t>
+            </a:r>
+            <a:r>
+              <a:rPr sz="1800">
+                <a:solidFill>
+                  <a:srgbClr val="4070A0"/>
+                </a:solidFill>
+                <a:latin typeface="Courier"/>
+              </a:rPr>
+              <a:t> </a:t>
+            </a:r>
+            <a:r>
+              <a:rPr sz="1800" i="1">
+                <a:solidFill>
+                  <a:srgbClr val="60A0B0"/>
+                </a:solidFill>
+                <a:latin typeface="Courier"/>
+              </a:rPr>
+              <a:t>#definindo a cor e o tamanho da linha </a:t>
+            </a:r>
+            <a:br/>
+            <a:r>
+              <a:rPr sz="1800">
+                <a:solidFill>
+                  <a:srgbClr val="4070A0"/>
+                </a:solidFill>
+                <a:latin typeface="Courier"/>
+              </a:rPr>
+              <a:t>  </a:t>
+            </a:r>
+            <a:r>
+              <a:rPr sz="1800" b="1">
+                <a:solidFill>
+                  <a:srgbClr val="007020"/>
+                </a:solidFill>
+                <a:latin typeface="Courier"/>
+              </a:rPr>
+              <a:t>theme_classic</a:t>
+            </a:r>
+            <a:r>
+              <a:rPr sz="1800">
+                <a:latin typeface="Courier"/>
+              </a:rPr>
+              <a:t>() </a:t>
+            </a:r>
+            <a:r>
+              <a:rPr sz="1800">
+                <a:solidFill>
+                  <a:srgbClr val="666666"/>
+                </a:solidFill>
+                <a:latin typeface="Courier"/>
+              </a:rPr>
+              <a:t>+</a:t>
+            </a:r>
+            <a:r>
+              <a:rPr sz="1800">
+                <a:solidFill>
+                  <a:srgbClr val="4070A0"/>
+                </a:solidFill>
+                <a:latin typeface="Courier"/>
+              </a:rPr>
+              <a:t>  </a:t>
+            </a:r>
+            <a:r>
+              <a:rPr sz="1800" i="1">
+                <a:solidFill>
+                  <a:srgbClr val="60A0B0"/>
+                </a:solidFill>
+                <a:latin typeface="Courier"/>
+              </a:rPr>
+              <a:t>#estabelecendo o tema do gráfico</a:t>
+            </a:r>
+            <a:br/>
+            <a:r>
+              <a:rPr sz="1800">
+                <a:solidFill>
+                  <a:srgbClr val="4070A0"/>
+                </a:solidFill>
+                <a:latin typeface="Courier"/>
+              </a:rPr>
+              <a:t>  </a:t>
+            </a:r>
+            <a:r>
+              <a:rPr sz="1800" b="1">
+                <a:solidFill>
+                  <a:srgbClr val="007020"/>
+                </a:solidFill>
+                <a:latin typeface="Courier"/>
+              </a:rPr>
+              <a:t>labs</a:t>
+            </a:r>
+            <a:r>
+              <a:rPr sz="1800">
+                <a:latin typeface="Courier"/>
+              </a:rPr>
+              <a:t>(</a:t>
+            </a:r>
+            <a:r>
+              <a:rPr sz="1800">
+                <a:solidFill>
+                  <a:srgbClr val="902000"/>
+                </a:solidFill>
+                <a:latin typeface="Courier"/>
+              </a:rPr>
+              <a:t>title =</a:t>
+            </a:r>
+            <a:r>
+              <a:rPr sz="1800">
+                <a:latin typeface="Courier"/>
+              </a:rPr>
+              <a:t> </a:t>
+            </a:r>
+            <a:r>
+              <a:rPr sz="1800">
+                <a:solidFill>
+                  <a:srgbClr val="4070A0"/>
+                </a:solidFill>
+                <a:latin typeface="Courier"/>
+              </a:rPr>
+              <a:t>"Promulgação de constituições ao longo do tempo"</a:t>
+            </a:r>
+            <a:r>
+              <a:rPr sz="1800">
+                <a:latin typeface="Courier"/>
+              </a:rPr>
+              <a:t>,</a:t>
+            </a:r>
+            <a:br/>
+            <a:r>
+              <a:rPr sz="1800">
+                <a:latin typeface="Courier"/>
+              </a:rPr>
+              <a:t>       </a:t>
+            </a:r>
+            <a:r>
+              <a:rPr sz="1800">
+                <a:solidFill>
+                  <a:srgbClr val="902000"/>
+                </a:solidFill>
+                <a:latin typeface="Courier"/>
+              </a:rPr>
+              <a:t>x =</a:t>
+            </a:r>
+            <a:r>
+              <a:rPr sz="1800">
+                <a:latin typeface="Courier"/>
+              </a:rPr>
+              <a:t> </a:t>
+            </a:r>
+            <a:r>
+              <a:rPr sz="1800">
+                <a:solidFill>
+                  <a:srgbClr val="4070A0"/>
+                </a:solidFill>
+                <a:latin typeface="Courier"/>
+              </a:rPr>
+              <a:t>"Ano de promulgação"</a:t>
+            </a:r>
+            <a:r>
+              <a:rPr sz="1800">
+                <a:latin typeface="Courier"/>
+              </a:rPr>
+              <a:t>,</a:t>
+            </a:r>
+            <a:br/>
+            <a:r>
+              <a:rPr sz="1800">
+                <a:latin typeface="Courier"/>
+              </a:rPr>
+              <a:t>       </a:t>
+            </a:r>
+            <a:r>
+              <a:rPr sz="1800">
+                <a:solidFill>
+                  <a:srgbClr val="902000"/>
+                </a:solidFill>
+                <a:latin typeface="Courier"/>
+              </a:rPr>
+              <a:t>y =</a:t>
+            </a:r>
+            <a:r>
+              <a:rPr sz="1800">
+                <a:latin typeface="Courier"/>
+              </a:rPr>
+              <a:t> </a:t>
+            </a:r>
+            <a:r>
+              <a:rPr sz="1800">
+                <a:solidFill>
+                  <a:srgbClr val="4070A0"/>
+                </a:solidFill>
+                <a:latin typeface="Courier"/>
+              </a:rPr>
+              <a:t>"densidade"</a:t>
+            </a:r>
+            <a:r>
+              <a:rPr sz="1800">
+                <a:latin typeface="Courier"/>
+              </a:rPr>
+              <a:t>) </a:t>
+            </a:r>
+            <a:r>
+              <a:rPr sz="1800" i="1">
+                <a:solidFill>
+                  <a:srgbClr val="60A0B0"/>
+                </a:solidFill>
+                <a:latin typeface="Courier"/>
+              </a:rPr>
+              <a:t>#nomeando os eixos</a:t>
+            </a:r>
+            <a:br/>
+            <a:br/>
+            <a:r>
+              <a:rPr sz="1800">
+                <a:latin typeface="Courier"/>
+              </a:rPr>
+              <a:t>grafico1                                      </a:t>
+            </a:r>
+          </a:p>
+        </p:txBody>
+      </p:sp>
+    </p:spTree>
+  </p:cSld>
+</p:sld>
+</file>
+
+<file path=ppt/slides/slide14.xml><?xml version="1.0" encoding="utf-8"?>
+<p:sld xmlns:a="http://schemas.openxmlformats.org/drawingml/2006/main" xmlns:r="http://schemas.openxmlformats.org/officeDocument/2006/relationships" xmlns:p="http://schemas.openxmlformats.org/presentationml/2006/main">
+  <p:cSld>
+    <p:spTree>
+      <p:nvGrpSpPr>
+        <p:cNvPr id="1" name=""/>
+        <p:cNvGrpSpPr/>
+        <p:nvPr/>
+      </p:nvGrpSpPr>
+      <p:grpSpPr>
+        <a:xfrm>
+          <a:off x="0" y="0"/>
+          <a:ext cx="0" cy="0"/>
+          <a:chOff x="0" y="0"/>
+          <a:chExt cx="0" cy="0"/>
+        </a:xfrm>
+      </p:grpSpPr>
+      <p:pic>
+        <p:nvPicPr>
+          <p:cNvPr descr="lista_3_apresentacao_files/figure-pptx/unnamed-chunk-7-1.png" id="0" name="Picture 1"/>
+          <p:cNvPicPr>
+            <a:picLocks noGrp="1" noChangeAspect="1"/>
+          </p:cNvPicPr>
+          <p:nvPr/>
+        </p:nvPicPr>
+        <p:blipFill>
+          <a:blip r:embed="rId2"/>
+          <a:stretch>
+            <a:fillRect/>
+          </a:stretch>
+        </p:blipFill>
+        <p:spPr bwMode="auto">
+          <a:xfrm>
+            <a:off x="1752600" y="1600200"/>
+            <a:ext cx="5651500" cy="4521200"/>
+          </a:xfrm>
+          <a:prstGeom prst="rect">
+            <a:avLst/>
+          </a:prstGeom>
+          <a:noFill/>
+          <a:ln w="9525">
+            <a:noFill/>
+            <a:headEnd/>
+            <a:tailEnd/>
+          </a:ln>
+        </p:spPr>
+      </p:pic>
+    </p:spTree>
+  </p:cSld>
+</p:sld>
+</file>
+
+<file path=ppt/slides/slide15.xml><?xml version="1.0" encoding="utf-8"?>
+<p:sld xmlns:a="http://schemas.openxmlformats.org/drawingml/2006/main" xmlns:r="http://schemas.openxmlformats.org/officeDocument/2006/relationships" xmlns:p="http://schemas.openxmlformats.org/presentationml/2006/main">
+  <p:cSld>
+    <p:spTree>
+      <p:nvGrpSpPr>
+        <p:cNvPr id="1" name=""/>
+        <p:cNvGrpSpPr/>
+        <p:nvPr/>
+      </p:nvGrpSpPr>
+      <p:grpSpPr>
+        <a:xfrm>
+          <a:off x="0" y="0"/>
+          <a:ext cx="0" cy="0"/>
+          <a:chOff x="0" y="0"/>
+          <a:chExt cx="0" cy="0"/>
+        </a:xfrm>
+      </p:grpSpPr>
+      <p:sp>
+        <p:nvSpPr>
+          <p:cNvPr id="2" name="Title 1"/>
+          <p:cNvSpPr>
+            <a:spLocks noGrp="1"/>
+          </p:cNvSpPr>
+          <p:nvPr>
+            <p:ph type="title"/>
+          </p:nvPr>
+        </p:nvSpPr>
+        <p:spPr/>
+        <p:txBody>
+          <a:bodyPr/>
+          <a:lstStyle/>
+          <a:p>
+            <a:pPr lvl="0" marL="0" indent="0">
+              <a:buNone/>
+            </a:pPr>
+            <a:r>
+              <a:rPr/>
+              <a:t>Gráfico</a:t>
+            </a:r>
+            <a:r>
+              <a:rPr/>
+              <a:t> </a:t>
+            </a:r>
+            <a:r>
+              <a:rPr/>
               <a:t>2</a:t>
             </a:r>
           </a:p>
         </p:txBody>
       </p:sp>
+      <p:sp>
+        <p:nvSpPr>
+          <p:cNvPr id="3" name="Content Placeholder 2"/>
+          <p:cNvSpPr>
+            <a:spLocks noGrp="1"/>
+          </p:cNvSpPr>
+          <p:nvPr>
+            <p:ph idx="1"/>
+          </p:nvPr>
+        </p:nvSpPr>
+        <p:spPr/>
+        <p:txBody>
+          <a:bodyPr/>
+          <a:lstStyle/>
+          <a:p>
+            <a:pPr lvl="0" marL="0" indent="0">
+              <a:spcBef>
+                <a:spcPts val="3000"/>
+              </a:spcBef>
+              <a:buNone/>
+            </a:pPr>
+            <a:r>
+              <a:rPr b="1"/>
+              <a:t>Justificando a escolha do gráfico 2</a:t>
+            </a:r>
+          </a:p>
+          <a:p>
+            <a:pPr lvl="1"/>
+            <a:r>
+              <a:rPr/>
+              <a:t>Optou-se por utilizar o tipo de gráfico de pontos (scatter chart) pelos seguintes motivos: ** O objetivo é observar a distribuição do número de palavras nas constituições de cada estado ** Temos duas variáveis em foco - total_word e state - para evidenciar a distribuição de palavras nas constituições dos Estados</a:t>
+            </a:r>
+          </a:p>
+        </p:txBody>
+      </p:sp>
+    </p:spTree>
+  </p:cSld>
+</p:sld>
+</file>
+
+<file path=ppt/slides/slide16.xml><?xml version="1.0" encoding="utf-8"?>
+<p:sld xmlns:a="http://schemas.openxmlformats.org/drawingml/2006/main" xmlns:r="http://schemas.openxmlformats.org/officeDocument/2006/relationships" xmlns:p="http://schemas.openxmlformats.org/presentationml/2006/main">
+  <p:cSld>
+    <p:spTree>
+      <p:nvGrpSpPr>
+        <p:cNvPr id="1" name=""/>
+        <p:cNvGrpSpPr/>
+        <p:nvPr/>
+      </p:nvGrpSpPr>
+      <p:grpSpPr>
+        <a:xfrm>
+          <a:off x="0" y="0"/>
+          <a:ext cx="0" cy="0"/>
+          <a:chOff x="0" y="0"/>
+          <a:chExt cx="0" cy="0"/>
+        </a:xfrm>
+      </p:grpSpPr>
+      <p:sp>
+        <p:nvSpPr>
+          <p:cNvPr id="2" name="Title 1"/>
+          <p:cNvSpPr>
+            <a:spLocks noGrp="1"/>
+          </p:cNvSpPr>
+          <p:nvPr>
+            <p:ph type="title"/>
+          </p:nvPr>
+        </p:nvSpPr>
+        <p:spPr/>
+        <p:txBody>
+          <a:bodyPr/>
+          <a:lstStyle/>
+          <a:p>
+            <a:pPr lvl="0" marL="0" indent="0">
+              <a:buNone/>
+            </a:pPr>
+            <a:r>
+              <a:rPr/>
+              <a:t>Manipulando</a:t>
+            </a:r>
+            <a:r>
+              <a:rPr/>
+              <a:t> </a:t>
+            </a:r>
+            <a:r>
+              <a:rPr/>
+              <a:t>os</a:t>
+            </a:r>
+            <a:r>
+              <a:rPr/>
+              <a:t> </a:t>
+            </a:r>
+            <a:r>
+              <a:rPr/>
+              <a:t>dados</a:t>
+            </a:r>
+            <a:r>
+              <a:rPr/>
+              <a:t> </a:t>
+            </a:r>
+            <a:r>
+              <a:rPr/>
+              <a:t>para</a:t>
+            </a:r>
+            <a:r>
+              <a:rPr/>
+              <a:t> </a:t>
+            </a:r>
+            <a:r>
+              <a:rPr/>
+              <a:t>o</a:t>
+            </a:r>
+            <a:r>
+              <a:rPr/>
+              <a:t> </a:t>
+            </a:r>
+            <a:r>
+              <a:rPr/>
+              <a:t>gráfico</a:t>
+            </a:r>
+            <a:r>
+              <a:rPr/>
+              <a:t> </a:t>
+            </a:r>
+            <a:r>
+              <a:rPr/>
+              <a:t>2</a:t>
+            </a:r>
+          </a:p>
+        </p:txBody>
+      </p:sp>
+      <p:sp>
+        <p:nvSpPr>
+          <p:cNvPr id="3" name="Content Placeholder 2"/>
+          <p:cNvSpPr>
+            <a:spLocks noGrp="1"/>
+          </p:cNvSpPr>
+          <p:nvPr>
+            <p:ph idx="1"/>
+          </p:nvPr>
+        </p:nvSpPr>
+        <p:spPr/>
+        <p:txBody>
+          <a:bodyPr/>
+          <a:lstStyle/>
+          <a:p>
+            <a:pPr lvl="1"/>
+            <a:r>
+              <a:rPr/>
+              <a:t>Ordenando a partir da ordem crescente de palavras para facilitar uma visualização linear no gráfico</a:t>
+            </a:r>
+          </a:p>
+          <a:p>
+            <a:pPr lvl="0" marL="1270000" indent="0">
+              <a:buNone/>
+            </a:pPr>
+            <a:r>
+              <a:rPr sz="1800">
+                <a:latin typeface="Courier"/>
+              </a:rPr>
+              <a:t>state_constitutions_word_count &lt;-</a:t>
+            </a:r>
+            <a:r>
+              <a:rPr sz="1800">
+                <a:solidFill>
+                  <a:srgbClr val="4070A0"/>
+                </a:solidFill>
+                <a:latin typeface="Courier"/>
+              </a:rPr>
+              <a:t> </a:t>
+            </a:r>
+            <a:r>
+              <a:rPr sz="1800">
+                <a:latin typeface="Courier"/>
+              </a:rPr>
+              <a:t>state_constitutions_word_count </a:t>
+            </a:r>
+            <a:r>
+              <a:rPr sz="1800">
+                <a:solidFill>
+                  <a:srgbClr val="666666"/>
+                </a:solidFill>
+                <a:latin typeface="Courier"/>
+              </a:rPr>
+              <a:t>%&gt;%</a:t>
+            </a:r>
+            <a:r>
+              <a:rPr sz="1800">
+                <a:solidFill>
+                  <a:srgbClr val="4070A0"/>
+                </a:solidFill>
+                <a:latin typeface="Courier"/>
+              </a:rPr>
+              <a:t> </a:t>
+            </a:r>
+            <a:r>
+              <a:rPr sz="1800" b="1">
+                <a:solidFill>
+                  <a:srgbClr val="007020"/>
+                </a:solidFill>
+                <a:latin typeface="Courier"/>
+              </a:rPr>
+              <a:t>arrange</a:t>
+            </a:r>
+            <a:r>
+              <a:rPr sz="1800">
+                <a:latin typeface="Courier"/>
+              </a:rPr>
+              <a:t>(total_words)</a:t>
+            </a:r>
+          </a:p>
+        </p:txBody>
+      </p:sp>
+    </p:spTree>
+  </p:cSld>
+</p:sld>
+</file>
+
+<file path=ppt/slides/slide17.xml><?xml version="1.0" encoding="utf-8"?>
+<p:sld xmlns:a="http://schemas.openxmlformats.org/drawingml/2006/main" xmlns:r="http://schemas.openxmlformats.org/officeDocument/2006/relationships" xmlns:p="http://schemas.openxmlformats.org/presentationml/2006/main">
+  <p:cSld>
+    <p:spTree>
+      <p:nvGrpSpPr>
+        <p:cNvPr id="1" name=""/>
+        <p:cNvGrpSpPr/>
+        <p:nvPr/>
+      </p:nvGrpSpPr>
+      <p:grpSpPr>
+        <a:xfrm>
+          <a:off x="0" y="0"/>
+          <a:ext cx="0" cy="0"/>
+          <a:chOff x="0" y="0"/>
+          <a:chExt cx="0" cy="0"/>
+        </a:xfrm>
+      </p:grpSpPr>
+      <p:sp>
+        <p:nvSpPr>
+          <p:cNvPr id="2" name="Title 1"/>
+          <p:cNvSpPr>
+            <a:spLocks noGrp="1"/>
+          </p:cNvSpPr>
+          <p:nvPr>
+            <p:ph type="title"/>
+          </p:nvPr>
+        </p:nvSpPr>
+        <p:spPr/>
+        <p:txBody>
+          <a:bodyPr/>
+          <a:lstStyle/>
+          <a:p>
+            <a:pPr lvl="0" marL="0" indent="0">
+              <a:buNone/>
+            </a:pPr>
+            <a:r>
+              <a:rPr/>
+              <a:t>Comentando</a:t>
+            </a:r>
+            <a:r>
+              <a:rPr/>
+              <a:t> </a:t>
+            </a:r>
+            <a:r>
+              <a:rPr/>
+              <a:t>os</a:t>
+            </a:r>
+            <a:r>
+              <a:rPr/>
+              <a:t> </a:t>
+            </a:r>
+            <a:r>
+              <a:rPr/>
+              <a:t>códigos</a:t>
+            </a:r>
+            <a:r>
+              <a:rPr/>
+              <a:t> </a:t>
+            </a:r>
+            <a:r>
+              <a:rPr/>
+              <a:t>do</a:t>
+            </a:r>
+            <a:r>
+              <a:rPr/>
+              <a:t> </a:t>
+            </a:r>
+            <a:r>
+              <a:rPr/>
+              <a:t>gráfico</a:t>
+            </a:r>
+            <a:r>
+              <a:rPr/>
+              <a:t> </a:t>
+            </a:r>
+            <a:r>
+              <a:rPr/>
+              <a:t>2</a:t>
+            </a:r>
+          </a:p>
+        </p:txBody>
+      </p:sp>
+      <p:sp>
+        <p:nvSpPr>
+          <p:cNvPr id="3" name="Content Placeholder 2"/>
+          <p:cNvSpPr>
+            <a:spLocks noGrp="1"/>
+          </p:cNvSpPr>
+          <p:nvPr>
+            <p:ph idx="1"/>
+          </p:nvPr>
+        </p:nvSpPr>
+        <p:spPr/>
+        <p:txBody>
+          <a:bodyPr/>
+          <a:lstStyle/>
+          <a:p>
+            <a:pPr lvl="1"/>
+            <a:r>
+              <a:rPr/>
+              <a:t>O gráfico terá as seguintes características:</a:t>
+            </a:r>
+          </a:p>
+          <a:p>
+            <a:pPr lvl="1">
+              <a:buAutoNum type="arabicPeriod"/>
+            </a:pPr>
+            <a:r>
+              <a:rPr/>
+              <a:t>Gemoetria de pontos - para identificar o número de palavras em cada constituição a partir dos Estados. geom_point()</a:t>
+            </a:r>
+          </a:p>
+          <a:p>
+            <a:pPr lvl="1">
+              <a:buAutoNum type="arabicPeriod"/>
+            </a:pPr>
+            <a:r>
+              <a:rPr/>
+              <a:t>Estética: 1.1 O eixo x será composto pelas abreviações dos nomes dos estados 1.1 O eixo y indicará o total de palavras na constituição daquele Estado. Optou-se por essa dinâmica para possibilitar que a variação entre o número de palavras nas constituições seja comunicado</a:t>
+            </a:r>
+          </a:p>
+          <a:p>
+            <a:pPr lvl="1">
+              <a:buAutoNum type="arabicPeriod"/>
+            </a:pPr>
+            <a:r>
+              <a:rPr/>
+              <a:t>Tema classic - fundo branco e sem grades para facilitar a visualização</a:t>
+            </a:r>
+          </a:p>
+          <a:p>
+            <a:pPr lvl="1">
+              <a:buAutoNum type="arabicPeriod"/>
+            </a:pPr>
+            <a:r>
+              <a:rPr/>
+              <a:t>Cor de contorno será vermelha</a:t>
+            </a:r>
+          </a:p>
+        </p:txBody>
+      </p:sp>
+    </p:spTree>
+  </p:cSld>
+</p:sld>
+</file>
+
+<file path=ppt/slides/slide18.xml><?xml version="1.0" encoding="utf-8"?>
+<p:sld xmlns:a="http://schemas.openxmlformats.org/drawingml/2006/main" xmlns:r="http://schemas.openxmlformats.org/officeDocument/2006/relationships" xmlns:p="http://schemas.openxmlformats.org/presentationml/2006/main">
+  <p:cSld>
+    <p:spTree>
+      <p:nvGrpSpPr>
+        <p:cNvPr id="1" name=""/>
+        <p:cNvGrpSpPr/>
+        <p:nvPr/>
+      </p:nvGrpSpPr>
+      <p:grpSpPr>
+        <a:xfrm>
+          <a:off x="0" y="0"/>
+          <a:ext cx="0" cy="0"/>
+          <a:chOff x="0" y="0"/>
+          <a:chExt cx="0" cy="0"/>
+        </a:xfrm>
+      </p:grpSpPr>
+      <p:sp>
+        <p:nvSpPr>
+          <p:cNvPr id="2" name="Title 1"/>
+          <p:cNvSpPr>
+            <a:spLocks noGrp="1"/>
+          </p:cNvSpPr>
+          <p:nvPr>
+            <p:ph type="title"/>
+          </p:nvPr>
+        </p:nvSpPr>
+        <p:spPr/>
+        <p:txBody>
+          <a:bodyPr/>
+          <a:lstStyle/>
+          <a:p>
+            <a:pPr lvl="0" marL="0" indent="0">
+              <a:buNone/>
+            </a:pPr>
+            <a:r>
+              <a:rPr/>
+              <a:t>Gráfico</a:t>
+            </a:r>
+            <a:r>
+              <a:rPr/>
+              <a:t> </a:t>
+            </a:r>
+            <a:r>
+              <a:rPr/>
+              <a:t>2</a:t>
+            </a:r>
+          </a:p>
+        </p:txBody>
+      </p:sp>
+      <p:sp>
+        <p:nvSpPr>
+          <p:cNvPr id="3" name="Content Placeholder 2"/>
+          <p:cNvSpPr>
+            <a:spLocks noGrp="1"/>
+          </p:cNvSpPr>
+          <p:nvPr>
+            <p:ph idx="1"/>
+          </p:nvPr>
+        </p:nvSpPr>
+        <p:spPr/>
+        <p:txBody>
+          <a:bodyPr/>
+          <a:lstStyle/>
+          <a:p>
+            <a:pPr lvl="0" marL="1270000" indent="0">
+              <a:buNone/>
+            </a:pPr>
+            <a:r>
+              <a:rPr sz="1800">
+                <a:latin typeface="Courier"/>
+              </a:rPr>
+              <a:t>grafico2 &lt;-</a:t>
+            </a:r>
+            <a:r>
+              <a:rPr sz="1800">
+                <a:solidFill>
+                  <a:srgbClr val="4070A0"/>
+                </a:solidFill>
+                <a:latin typeface="Courier"/>
+              </a:rPr>
+              <a:t> </a:t>
+            </a:r>
+            <a:r>
+              <a:rPr sz="1800" b="1">
+                <a:solidFill>
+                  <a:srgbClr val="007020"/>
+                </a:solidFill>
+                <a:latin typeface="Courier"/>
+              </a:rPr>
+              <a:t>ggplot</a:t>
+            </a:r>
+            <a:r>
+              <a:rPr sz="1800">
+                <a:latin typeface="Courier"/>
+              </a:rPr>
+              <a:t>(state_constitutions_word_count, </a:t>
+            </a:r>
+            <a:r>
+              <a:rPr sz="1800" b="1">
+                <a:solidFill>
+                  <a:srgbClr val="007020"/>
+                </a:solidFill>
+                <a:latin typeface="Courier"/>
+              </a:rPr>
+              <a:t>aes</a:t>
+            </a:r>
+            <a:r>
+              <a:rPr sz="1800">
+                <a:latin typeface="Courier"/>
+              </a:rPr>
+              <a:t>(</a:t>
+            </a:r>
+            <a:r>
+              <a:rPr sz="1800">
+                <a:solidFill>
+                  <a:srgbClr val="902000"/>
+                </a:solidFill>
+                <a:latin typeface="Courier"/>
+              </a:rPr>
+              <a:t>x=</a:t>
+            </a:r>
+            <a:r>
+              <a:rPr sz="1800">
+                <a:latin typeface="Courier"/>
+              </a:rPr>
+              <a:t>abv_state, </a:t>
+            </a:r>
+            <a:r>
+              <a:rPr sz="1800">
+                <a:solidFill>
+                  <a:srgbClr val="902000"/>
+                </a:solidFill>
+                <a:latin typeface="Courier"/>
+              </a:rPr>
+              <a:t>y=</a:t>
+            </a:r>
+            <a:r>
+              <a:rPr sz="1800">
+                <a:latin typeface="Courier"/>
+              </a:rPr>
+              <a:t>total_words)) </a:t>
+            </a:r>
+            <a:r>
+              <a:rPr sz="1800">
+                <a:solidFill>
+                  <a:srgbClr val="666666"/>
+                </a:solidFill>
+                <a:latin typeface="Courier"/>
+              </a:rPr>
+              <a:t>+</a:t>
+            </a:r>
+            <a:r>
+              <a:rPr sz="1800">
+                <a:solidFill>
+                  <a:srgbClr val="4070A0"/>
+                </a:solidFill>
+                <a:latin typeface="Courier"/>
+              </a:rPr>
+              <a:t> </a:t>
+            </a:r>
+            <a:r>
+              <a:rPr sz="1800" i="1">
+                <a:solidFill>
+                  <a:srgbClr val="60A0B0"/>
+                </a:solidFill>
+                <a:latin typeface="Courier"/>
+              </a:rPr>
+              <a:t>#definindo os dados a serem projetados nos eixos x e y</a:t>
+            </a:r>
+            <a:br/>
+            <a:r>
+              <a:rPr sz="1800">
+                <a:solidFill>
+                  <a:srgbClr val="4070A0"/>
+                </a:solidFill>
+                <a:latin typeface="Courier"/>
+              </a:rPr>
+              <a:t>  </a:t>
+            </a:r>
+            <a:r>
+              <a:rPr sz="1800" b="1">
+                <a:solidFill>
+                  <a:srgbClr val="007020"/>
+                </a:solidFill>
+                <a:latin typeface="Courier"/>
+              </a:rPr>
+              <a:t>geom_point</a:t>
+            </a:r>
+            <a:r>
+              <a:rPr sz="1800">
+                <a:latin typeface="Courier"/>
+              </a:rPr>
+              <a:t>(</a:t>
+            </a:r>
+            <a:r>
+              <a:rPr sz="1800">
+                <a:solidFill>
+                  <a:srgbClr val="902000"/>
+                </a:solidFill>
+                <a:latin typeface="Courier"/>
+              </a:rPr>
+              <a:t>color=</a:t>
+            </a:r>
+            <a:r>
+              <a:rPr sz="1800">
+                <a:solidFill>
+                  <a:srgbClr val="4070A0"/>
+                </a:solidFill>
+                <a:latin typeface="Courier"/>
+              </a:rPr>
+              <a:t>"red"</a:t>
+            </a:r>
+            <a:r>
+              <a:rPr sz="1800">
+                <a:latin typeface="Courier"/>
+              </a:rPr>
+              <a:t>, </a:t>
+            </a:r>
+            <a:r>
+              <a:rPr sz="1800">
+                <a:solidFill>
+                  <a:srgbClr val="902000"/>
+                </a:solidFill>
+                <a:latin typeface="Courier"/>
+              </a:rPr>
+              <a:t>size=</a:t>
+            </a:r>
+            <a:r>
+              <a:rPr sz="1800">
+                <a:solidFill>
+                  <a:srgbClr val="40A070"/>
+                </a:solidFill>
+                <a:latin typeface="Courier"/>
+              </a:rPr>
+              <a:t>1</a:t>
+            </a:r>
+            <a:r>
+              <a:rPr sz="1800">
+                <a:latin typeface="Courier"/>
+              </a:rPr>
+              <a:t>, </a:t>
+            </a:r>
+            <a:r>
+              <a:rPr sz="1800">
+                <a:solidFill>
+                  <a:srgbClr val="902000"/>
+                </a:solidFill>
+                <a:latin typeface="Courier"/>
+              </a:rPr>
+              <a:t>fill=</a:t>
+            </a:r>
+            <a:r>
+              <a:rPr sz="1800">
+                <a:solidFill>
+                  <a:srgbClr val="4070A0"/>
+                </a:solidFill>
+                <a:latin typeface="Courier"/>
+              </a:rPr>
+              <a:t>"red"</a:t>
+            </a:r>
+            <a:r>
+              <a:rPr sz="1800">
+                <a:latin typeface="Courier"/>
+              </a:rPr>
+              <a:t>) </a:t>
+            </a:r>
+            <a:r>
+              <a:rPr sz="1800">
+                <a:solidFill>
+                  <a:srgbClr val="666666"/>
+                </a:solidFill>
+                <a:latin typeface="Courier"/>
+              </a:rPr>
+              <a:t>+</a:t>
+            </a:r>
+            <a:r>
+              <a:rPr sz="1800">
+                <a:solidFill>
+                  <a:srgbClr val="4070A0"/>
+                </a:solidFill>
+                <a:latin typeface="Courier"/>
+              </a:rPr>
+              <a:t> </a:t>
+            </a:r>
+            <a:r>
+              <a:rPr sz="1800" i="1">
+                <a:solidFill>
+                  <a:srgbClr val="60A0B0"/>
+                </a:solidFill>
+                <a:latin typeface="Courier"/>
+              </a:rPr>
+              <a:t>#definindo a geometria scatter com cor de contorno e preenchimento vermelhas e o tamanho do preenchimento</a:t>
+            </a:r>
+            <a:br/>
+            <a:r>
+              <a:rPr sz="1800">
+                <a:solidFill>
+                  <a:srgbClr val="4070A0"/>
+                </a:solidFill>
+                <a:latin typeface="Courier"/>
+              </a:rPr>
+              <a:t>  </a:t>
+            </a:r>
+            <a:r>
+              <a:rPr sz="1800" b="1">
+                <a:solidFill>
+                  <a:srgbClr val="007020"/>
+                </a:solidFill>
+                <a:latin typeface="Courier"/>
+              </a:rPr>
+              <a:t>theme_classic</a:t>
+            </a:r>
+            <a:r>
+              <a:rPr sz="1800">
+                <a:latin typeface="Courier"/>
+              </a:rPr>
+              <a:t>() </a:t>
+            </a:r>
+            <a:r>
+              <a:rPr sz="1800">
+                <a:solidFill>
+                  <a:srgbClr val="666666"/>
+                </a:solidFill>
+                <a:latin typeface="Courier"/>
+              </a:rPr>
+              <a:t>+</a:t>
+            </a:r>
+            <a:r>
+              <a:rPr sz="1800">
+                <a:solidFill>
+                  <a:srgbClr val="4070A0"/>
+                </a:solidFill>
+                <a:latin typeface="Courier"/>
+              </a:rPr>
+              <a:t>  </a:t>
+            </a:r>
+            <a:r>
+              <a:rPr sz="1800" i="1">
+                <a:solidFill>
+                  <a:srgbClr val="60A0B0"/>
+                </a:solidFill>
+                <a:latin typeface="Courier"/>
+              </a:rPr>
+              <a:t>#definindo o tema classico</a:t>
+            </a:r>
+            <a:br/>
+            <a:r>
+              <a:rPr sz="1800">
+                <a:solidFill>
+                  <a:srgbClr val="4070A0"/>
+                </a:solidFill>
+                <a:latin typeface="Courier"/>
+              </a:rPr>
+              <a:t>  </a:t>
+            </a:r>
+            <a:r>
+              <a:rPr sz="1800" b="1">
+                <a:solidFill>
+                  <a:srgbClr val="007020"/>
+                </a:solidFill>
+                <a:latin typeface="Courier"/>
+              </a:rPr>
+              <a:t>labs</a:t>
+            </a:r>
+            <a:r>
+              <a:rPr sz="1800">
+                <a:latin typeface="Courier"/>
+              </a:rPr>
+              <a:t>(</a:t>
+            </a:r>
+            <a:r>
+              <a:rPr sz="1800">
+                <a:solidFill>
+                  <a:srgbClr val="902000"/>
+                </a:solidFill>
+                <a:latin typeface="Courier"/>
+              </a:rPr>
+              <a:t>title =</a:t>
+            </a:r>
+            <a:r>
+              <a:rPr sz="1800">
+                <a:latin typeface="Courier"/>
+              </a:rPr>
+              <a:t> </a:t>
+            </a:r>
+            <a:r>
+              <a:rPr sz="1800">
+                <a:solidFill>
+                  <a:srgbClr val="4070A0"/>
+                </a:solidFill>
+                <a:latin typeface="Courier"/>
+              </a:rPr>
+              <a:t>"Palavras nas constituições por estado"</a:t>
+            </a:r>
+            <a:r>
+              <a:rPr sz="1800">
+                <a:latin typeface="Courier"/>
+              </a:rPr>
+              <a:t>, </a:t>
+            </a:r>
+            <a:r>
+              <a:rPr sz="1800">
+                <a:solidFill>
+                  <a:srgbClr val="902000"/>
+                </a:solidFill>
+                <a:latin typeface="Courier"/>
+              </a:rPr>
+              <a:t>x =</a:t>
+            </a:r>
+            <a:r>
+              <a:rPr sz="1800">
+                <a:latin typeface="Courier"/>
+              </a:rPr>
+              <a:t> </a:t>
+            </a:r>
+            <a:r>
+              <a:rPr sz="1800">
+                <a:solidFill>
+                  <a:srgbClr val="4070A0"/>
+                </a:solidFill>
+                <a:latin typeface="Courier"/>
+              </a:rPr>
+              <a:t>"estado"</a:t>
+            </a:r>
+            <a:r>
+              <a:rPr sz="1800">
+                <a:latin typeface="Courier"/>
+              </a:rPr>
+              <a:t>,</a:t>
+            </a:r>
+            <a:br/>
+            <a:r>
+              <a:rPr sz="1800">
+                <a:latin typeface="Courier"/>
+              </a:rPr>
+              <a:t>       </a:t>
+            </a:r>
+            <a:r>
+              <a:rPr sz="1800">
+                <a:solidFill>
+                  <a:srgbClr val="902000"/>
+                </a:solidFill>
+                <a:latin typeface="Courier"/>
+              </a:rPr>
+              <a:t>y =</a:t>
+            </a:r>
+            <a:r>
+              <a:rPr sz="1800">
+                <a:latin typeface="Courier"/>
+              </a:rPr>
+              <a:t> </a:t>
+            </a:r>
+            <a:r>
+              <a:rPr sz="1800">
+                <a:solidFill>
+                  <a:srgbClr val="4070A0"/>
+                </a:solidFill>
+                <a:latin typeface="Courier"/>
+              </a:rPr>
+              <a:t>"número de palavras"</a:t>
+            </a:r>
+            <a:r>
+              <a:rPr sz="1800">
+                <a:latin typeface="Courier"/>
+              </a:rPr>
+              <a:t>) </a:t>
+            </a:r>
+            <a:r>
+              <a:rPr sz="1800" i="1">
+                <a:solidFill>
+                  <a:srgbClr val="60A0B0"/>
+                </a:solidFill>
+                <a:latin typeface="Courier"/>
+              </a:rPr>
+              <a:t>#nomeando o gráfico e os eixos</a:t>
+            </a:r>
+            <a:br/>
+            <a:br/>
+            <a:r>
+              <a:rPr sz="1800">
+                <a:latin typeface="Courier"/>
+              </a:rPr>
+              <a:t>grafico2</a:t>
+            </a:r>
+          </a:p>
+        </p:txBody>
+      </p:sp>
+    </p:spTree>
+  </p:cSld>
+</p:sld>
+</file>
+
+<file path=ppt/slides/slide19.xml><?xml version="1.0" encoding="utf-8"?>
+<p:sld xmlns:a="http://schemas.openxmlformats.org/drawingml/2006/main" xmlns:r="http://schemas.openxmlformats.org/officeDocument/2006/relationships" xmlns:p="http://schemas.openxmlformats.org/presentationml/2006/main">
+  <p:cSld>
+    <p:spTree>
+      <p:nvGrpSpPr>
+        <p:cNvPr id="1" name=""/>
+        <p:cNvGrpSpPr/>
+        <p:nvPr/>
+      </p:nvGrpSpPr>
+      <p:grpSpPr>
+        <a:xfrm>
+          <a:off x="0" y="0"/>
+          <a:ext cx="0" cy="0"/>
+          <a:chOff x="0" y="0"/>
+          <a:chExt cx="0" cy="0"/>
+        </a:xfrm>
+      </p:grpSpPr>
       <p:pic>
         <p:nvPicPr>
           <p:cNvPr descr="lista_3_apresentacao_files/figure-pptx/unnamed-chunk-9-1.png" id="0" name="Picture 1"/>
@@ -4039,15 +6055,6 @@
               <a:t>)</a:t>
             </a:r>
           </a:p>
-          <a:p>
-            <a:pPr lvl="0" marL="0" indent="0">
-              <a:buNone/>
-            </a:pPr>
-            <a:r>
-              <a:rPr/>
-              <a:t>#Informações trazidas pela base de dados - As antigas Constituições, não-vigentes, são indicadaspelo número 0 da coluna “current_constitution”. - As Constituições vigentes em cada Estado são indicada pelo número 1 da coluna “current_constitution”. - Cada variável informa o número de palavras daquele grupo naquela constituição. * Exemplo: a variável “discrimination” informa quantas palavras associadas à discriminação foram encontradas na Constituição a qual aquela observação se refere. - Uso a função glimpse para dar um panorama geral da base de dados, trazendo informações sobre o número de linhas, colunas, as variáveis e seus tipos.</a:t>
-            </a:r>
-          </a:p>
         </p:txBody>
       </p:sp>
     </p:spTree>
@@ -4056,6 +6063,144 @@
 </file>
 
 <file path=ppt/slides/slide4.xml><?xml version="1.0" encoding="utf-8"?>
+<p:sld xmlns:a="http://schemas.openxmlformats.org/drawingml/2006/main" xmlns:r="http://schemas.openxmlformats.org/officeDocument/2006/relationships" xmlns:p="http://schemas.openxmlformats.org/presentationml/2006/main">
+  <p:cSld>
+    <p:spTree>
+      <p:nvGrpSpPr>
+        <p:cNvPr id="1" name=""/>
+        <p:cNvGrpSpPr/>
+        <p:nvPr/>
+      </p:nvGrpSpPr>
+      <p:grpSpPr>
+        <a:xfrm>
+          <a:off x="0" y="0"/>
+          <a:ext cx="0" cy="0"/>
+          <a:chOff x="0" y="0"/>
+          <a:chExt cx="0" cy="0"/>
+        </a:xfrm>
+      </p:grpSpPr>
+      <p:sp>
+        <p:nvSpPr>
+          <p:cNvPr id="2" name="Title 1"/>
+          <p:cNvSpPr>
+            <a:spLocks noGrp="1"/>
+          </p:cNvSpPr>
+          <p:nvPr>
+            <p:ph type="title"/>
+          </p:nvPr>
+        </p:nvSpPr>
+        <p:spPr/>
+        <p:txBody>
+          <a:bodyPr/>
+          <a:lstStyle/>
+          <a:p>
+            <a:pPr lvl="0" marL="0" indent="0">
+              <a:buNone/>
+            </a:pPr>
+            <a:r>
+              <a:rPr/>
+              <a:t>Informações</a:t>
+            </a:r>
+            <a:r>
+              <a:rPr/>
+              <a:t> </a:t>
+            </a:r>
+            <a:r>
+              <a:rPr/>
+              <a:t>trazidas</a:t>
+            </a:r>
+            <a:r>
+              <a:rPr/>
+              <a:t> </a:t>
+            </a:r>
+            <a:r>
+              <a:rPr/>
+              <a:t>pela</a:t>
+            </a:r>
+            <a:r>
+              <a:rPr/>
+              <a:t> </a:t>
+            </a:r>
+            <a:r>
+              <a:rPr/>
+              <a:t>base</a:t>
+            </a:r>
+            <a:r>
+              <a:rPr/>
+              <a:t> </a:t>
+            </a:r>
+            <a:r>
+              <a:rPr/>
+              <a:t>de</a:t>
+            </a:r>
+            <a:r>
+              <a:rPr/>
+              <a:t> </a:t>
+            </a:r>
+            <a:r>
+              <a:rPr/>
+              <a:t>dados</a:t>
+            </a:r>
+          </a:p>
+        </p:txBody>
+      </p:sp>
+      <p:sp>
+        <p:nvSpPr>
+          <p:cNvPr id="3" name="Content Placeholder 2"/>
+          <p:cNvSpPr>
+            <a:spLocks noGrp="1"/>
+          </p:cNvSpPr>
+          <p:nvPr>
+            <p:ph idx="1"/>
+          </p:nvPr>
+        </p:nvSpPr>
+        <p:spPr/>
+        <p:txBody>
+          <a:bodyPr/>
+          <a:lstStyle/>
+          <a:p>
+            <a:pPr lvl="1"/>
+            <a:r>
+              <a:rPr/>
+              <a:t>As antigas Constituições, não-vigentes, são indicadaspelo número 0 da coluna “current_constitution”.</a:t>
+            </a:r>
+          </a:p>
+          <a:p>
+            <a:pPr lvl="1"/>
+            <a:r>
+              <a:rPr/>
+              <a:t>As Constituições vigentes em cada Estado são indicada pelo número 1 da coluna “current_constitution”.</a:t>
+            </a:r>
+          </a:p>
+          <a:p>
+            <a:pPr lvl="1"/>
+            <a:r>
+              <a:rPr/>
+              <a:t>Cada variável informa o número de palavras daquele grupo naquela constituição.</a:t>
+            </a:r>
+          </a:p>
+          <a:p>
+            <a:pPr lvl="1"/>
+            <a:r>
+              <a:rPr/>
+              <a:t>Exemplo: a variável “discrimination” informa quantas palavras associadas à discriminação foram encontradas na Constituição a qual aquela observação se refere.</a:t>
+            </a:r>
+          </a:p>
+          <a:p>
+            <a:pPr lvl="1"/>
+            <a:r>
+              <a:rPr/>
+              <a:t>Uso a função glimpse para dar um panorama geral da base de dados, trazendo informações sobre o número de linhas, colunas, as variáveis e seus tipos.</a:t>
+            </a:r>
+          </a:p>
+        </p:txBody>
+      </p:sp>
+    </p:spTree>
+  </p:cSld>
+</p:sld>
+</file>
+
+<file path=ppt/slides/slide5.xml><?xml version="1.0" encoding="utf-8"?>
 <p:sld xmlns:a="http://schemas.openxmlformats.org/drawingml/2006/main" xmlns:r="http://schemas.openxmlformats.org/officeDocument/2006/relationships" xmlns:p="http://schemas.openxmlformats.org/presentationml/2006/main">
   <p:cSld>
     <p:spTree>
@@ -4220,99 +6365,6 @@
 </p:sld>
 </file>
 
-<file path=ppt/slides/slide5.xml><?xml version="1.0" encoding="utf-8"?>
-<p:sld xmlns:a="http://schemas.openxmlformats.org/drawingml/2006/main" xmlns:r="http://schemas.openxmlformats.org/officeDocument/2006/relationships" xmlns:p="http://schemas.openxmlformats.org/presentationml/2006/main">
-  <p:cSld>
-    <p:spTree>
-      <p:nvGrpSpPr>
-        <p:cNvPr id="1" name=""/>
-        <p:cNvGrpSpPr/>
-        <p:nvPr/>
-      </p:nvGrpSpPr>
-      <p:grpSpPr>
-        <a:xfrm>
-          <a:off x="0" y="0"/>
-          <a:ext cx="0" cy="0"/>
-          <a:chOff x="0" y="0"/>
-          <a:chExt cx="0" cy="0"/>
-        </a:xfrm>
-      </p:grpSpPr>
-      <p:sp>
-        <p:nvSpPr>
-          <p:cNvPr id="2" name="Title 1"/>
-          <p:cNvSpPr>
-            <a:spLocks noGrp="1"/>
-          </p:cNvSpPr>
-          <p:nvPr>
-            <p:ph type="title"/>
-          </p:nvPr>
-        </p:nvSpPr>
-        <p:spPr/>
-        <p:txBody>
-          <a:bodyPr/>
-          <a:lstStyle/>
-          <a:p>
-            <a:pPr lvl="0" marL="0" indent="0">
-              <a:buNone/>
-            </a:pPr>
-            <a:r>
-              <a:rPr/>
-              <a:t>Objetivo</a:t>
-            </a:r>
-            <a:r>
-              <a:rPr/>
-              <a:t> </a:t>
-            </a:r>
-            <a:r>
-              <a:rPr/>
-              <a:t>deste</a:t>
-            </a:r>
-            <a:r>
-              <a:rPr/>
-              <a:t> </a:t>
-            </a:r>
-            <a:r>
-              <a:rPr/>
-              <a:t>trabalho</a:t>
-            </a:r>
-          </a:p>
-        </p:txBody>
-      </p:sp>
-      <p:sp>
-        <p:nvSpPr>
-          <p:cNvPr id="3" name="Content Placeholder 2"/>
-          <p:cNvSpPr>
-            <a:spLocks noGrp="1"/>
-          </p:cNvSpPr>
-          <p:nvPr>
-            <p:ph idx="1"/>
-          </p:nvPr>
-        </p:nvSpPr>
-        <p:spPr/>
-        <p:txBody>
-          <a:bodyPr/>
-          <a:lstStyle/>
-          <a:p>
-            <a:pPr lvl="1"/>
-            <a:r>
-              <a:rPr/>
-              <a:t>Neste trabalho objetivo analisar as constituições atuais a partir do total de palavras e dos anos em que foram promulgadas. Para isso irei selecionar as colunas de interesse usando o pacote dplyr.</a:t>
-            </a:r>
-          </a:p>
-          <a:p>
-            <a:pPr lvl="1"/>
-            <a:r>
-              <a:rPr/>
-              <a:t>Após selecionar as variáveis de interesse irei filtrar apenas as Constituições vigentes.</a:t>
-            </a:r>
-          </a:p>
-        </p:txBody>
-      </p:sp>
-    </p:spTree>
-  </p:cSld>
-</p:sld>
-</file>
-
 <file path=ppt/slides/slide6.xml><?xml version="1.0" encoding="utf-8"?>
 <p:sld xmlns:a="http://schemas.openxmlformats.org/drawingml/2006/main" xmlns:r="http://schemas.openxmlformats.org/officeDocument/2006/relationships" xmlns:p="http://schemas.openxmlformats.org/presentationml/2006/main">
   <p:cSld>
@@ -4350,39 +6402,23 @@
             </a:pPr>
             <a:r>
               <a:rPr/>
-              <a:t>Selecionando</a:t>
-            </a:r>
-            <a:r>
-              <a:rPr/>
-              <a:t> </a:t>
-            </a:r>
-            <a:r>
-              <a:rPr/>
-              <a:t>as</a:t>
-            </a:r>
-            <a:r>
-              <a:rPr/>
-              <a:t> </a:t>
-            </a:r>
-            <a:r>
-              <a:rPr/>
-              <a:t>variáveis</a:t>
-            </a:r>
-            <a:r>
-              <a:rPr/>
-              <a:t> </a:t>
-            </a:r>
-            <a:r>
-              <a:rPr/>
-              <a:t>de</a:t>
-            </a:r>
-            <a:r>
-              <a:rPr/>
-              <a:t> </a:t>
-            </a:r>
-            <a:r>
-              <a:rPr/>
-              <a:t>interesse</a:t>
+              <a:t>Objetivo</a:t>
+            </a:r>
+            <a:r>
+              <a:rPr/>
+              <a:t> </a:t>
+            </a:r>
+            <a:r>
+              <a:rPr/>
+              <a:t>deste</a:t>
+            </a:r>
+            <a:r>
+              <a:rPr/>
+              <a:t> </a:t>
+            </a:r>
+            <a:r>
+              <a:rPr/>
+              <a:t>trabalho</a:t>
             </a:r>
           </a:p>
         </p:txBody>
@@ -4405,39 +6441,14 @@
             <a:pPr lvl="1"/>
             <a:r>
               <a:rPr/>
-              <a:t>A partir do banco de dados, objetivo criar gráfico dois gráficos:</a:t>
-            </a:r>
-          </a:p>
-          <a:p>
-            <a:pPr lvl="1">
-              <a:buAutoNum type="arabicPeriod"/>
-            </a:pPr>
-            <a:r>
-              <a:rPr/>
-              <a:t>Gráfico 1 - gráfico que evidencie a variação das datas de promulgação das constituições estaduais</a:t>
-            </a:r>
-          </a:p>
-          <a:p>
-            <a:pPr lvl="1">
-              <a:buAutoNum type="arabicPeriod"/>
-            </a:pPr>
-            <a:r>
-              <a:rPr/>
-              <a:t>Gráfico 2 - gráfico que ajude a identificar a variação do número de palavras das constituições vigentes em cada Estado.</a:t>
+              <a:t>Neste trabalho objetivo analisar as constituições atuais a partir do total de palavras e dos anos em que foram promulgadas. Para isso irei selecionar as colunas de interesse usando o pacote dplyr.</a:t>
             </a:r>
           </a:p>
           <a:p>
             <a:pPr lvl="1"/>
             <a:r>
               <a:rPr/>
-              <a:t>Para isso seleciono apenas as variáveis de interesse: nome do estado, ano da constituição, constituição atual e total de palavras</a:t>
-            </a:r>
-          </a:p>
-          <a:p>
-            <a:pPr lvl="1"/>
-            <a:r>
-              <a:rPr/>
-              <a:t>Filtro apenas as constituições vigentes</a:t>
+              <a:t>Após selecionar as variáveis de interesse irei filtrar apenas as Constituições vigentes.</a:t>
             </a:r>
           </a:p>
         </p:txBody>
@@ -4521,6 +6532,61 @@
           </a:p>
         </p:txBody>
       </p:sp>
+      <p:sp>
+        <p:nvSpPr>
+          <p:cNvPr id="3" name="Content Placeholder 2"/>
+          <p:cNvSpPr>
+            <a:spLocks noGrp="1"/>
+          </p:cNvSpPr>
+          <p:nvPr>
+            <p:ph idx="1"/>
+          </p:nvPr>
+        </p:nvSpPr>
+        <p:spPr/>
+        <p:txBody>
+          <a:bodyPr/>
+          <a:lstStyle/>
+          <a:p>
+            <a:pPr lvl="1"/>
+            <a:r>
+              <a:rPr/>
+              <a:t>A partir do banco de dados, objetivo criar gráfico dois gráficos:</a:t>
+            </a:r>
+          </a:p>
+          <a:p>
+            <a:pPr lvl="1">
+              <a:buAutoNum type="arabicPeriod"/>
+            </a:pPr>
+            <a:r>
+              <a:rPr/>
+              <a:t>Gráfico 1 - gráfico que evidencie a variação das datas de promulgação das constituições estaduais</a:t>
+            </a:r>
+          </a:p>
+          <a:p>
+            <a:pPr lvl="1">
+              <a:buAutoNum type="arabicPeriod"/>
+            </a:pPr>
+            <a:r>
+              <a:rPr/>
+              <a:t>Gráfico 2 - gráfico que ajude a identificar a variação do número de palavras das constituições vigentes em cada Estado.</a:t>
+            </a:r>
+          </a:p>
+          <a:p>
+            <a:pPr lvl="1"/>
+            <a:r>
+              <a:rPr/>
+              <a:t>Para isso seleciono apenas as variáveis de interesse: nome do estado, ano da constituição, constituição atual e total de palavras</a:t>
+            </a:r>
+          </a:p>
+          <a:p>
+            <a:pPr lvl="1"/>
+            <a:r>
+              <a:rPr/>
+              <a:t>Filtro apenas as constituições vigentes</a:t>
+            </a:r>
+          </a:p>
+        </p:txBody>
+      </p:sp>
     </p:spTree>
   </p:cSld>
 </p:sld>
@@ -4563,23 +6629,23 @@
             </a:pPr>
             <a:r>
               <a:rPr/>
-              <a:t>Visualizando</a:t>
-            </a:r>
-            <a:r>
-              <a:rPr/>
-              <a:t> </a:t>
-            </a:r>
-            <a:r>
-              <a:rPr/>
-              <a:t>a</a:t>
-            </a:r>
-            <a:r>
-              <a:rPr/>
-              <a:t> </a:t>
-            </a:r>
-            <a:r>
-              <a:rPr/>
-              <a:t>base</a:t>
+              <a:t>Selecionando</a:t>
+            </a:r>
+            <a:r>
+              <a:rPr/>
+              <a:t> </a:t>
+            </a:r>
+            <a:r>
+              <a:rPr/>
+              <a:t>as</a:t>
+            </a:r>
+            <a:r>
+              <a:rPr/>
+              <a:t> </a:t>
+            </a:r>
+            <a:r>
+              <a:rPr/>
+              <a:t>variáveis</a:t>
             </a:r>
             <a:r>
               <a:rPr/>
@@ -4595,23 +6661,7 @@
             </a:r>
             <a:r>
               <a:rPr/>
-              <a:t>dados</a:t>
-            </a:r>
-            <a:r>
-              <a:rPr/>
-              <a:t> </a:t>
-            </a:r>
-            <a:r>
-              <a:rPr/>
-              <a:t>após</a:t>
-            </a:r>
-            <a:r>
-              <a:rPr/>
-              <a:t> </a:t>
-            </a:r>
-            <a:r>
-              <a:rPr/>
-              <a:t>manipulação</a:t>
+              <a:t>interesse</a:t>
             </a:r>
           </a:p>
         </p:txBody>
@@ -4635,19 +6685,152 @@
               <a:buNone/>
             </a:pPr>
             <a:r>
+              <a:rPr sz="1800">
+                <a:latin typeface="Courier"/>
+              </a:rPr>
+              <a:t>state_constitutions_word_count &lt;-</a:t>
+            </a:r>
+            <a:r>
+              <a:rPr sz="1800">
+                <a:solidFill>
+                  <a:srgbClr val="4070A0"/>
+                </a:solidFill>
+                <a:latin typeface="Courier"/>
+              </a:rPr>
+              <a:t> </a:t>
+            </a:r>
+            <a:r>
+              <a:rPr sz="1800">
+                <a:latin typeface="Courier"/>
+              </a:rPr>
+              <a:t>state_constitutions_word_count </a:t>
+            </a:r>
+            <a:r>
+              <a:rPr sz="1800">
+                <a:solidFill>
+                  <a:srgbClr val="666666"/>
+                </a:solidFill>
+                <a:latin typeface="Courier"/>
+              </a:rPr>
+              <a:t>%&gt;%</a:t>
+            </a:r>
+            <a:r>
+              <a:rPr sz="1800">
+                <a:solidFill>
+                  <a:srgbClr val="4070A0"/>
+                </a:solidFill>
+                <a:latin typeface="Courier"/>
+              </a:rPr>
+              <a:t> </a:t>
+            </a:r>
+            <a:r>
               <a:rPr sz="1800" b="1">
                 <a:solidFill>
                   <a:srgbClr val="007020"/>
                 </a:solidFill>
                 <a:latin typeface="Courier"/>
               </a:rPr>
-              <a:t>View</a:t>
-            </a:r>
-            <a:r>
-              <a:rPr sz="1800">
-                <a:latin typeface="Courier"/>
-              </a:rPr>
-              <a:t>(state_constitutions_word_count)</a:t>
+              <a:t>select</a:t>
+            </a:r>
+            <a:r>
+              <a:rPr sz="1800">
+                <a:latin typeface="Courier"/>
+              </a:rPr>
+              <a:t>(state, constitution_year, current_constitution, total_words) </a:t>
+            </a:r>
+            <a:r>
+              <a:rPr sz="1800">
+                <a:solidFill>
+                  <a:srgbClr val="666666"/>
+                </a:solidFill>
+                <a:latin typeface="Courier"/>
+              </a:rPr>
+              <a:t>%&gt;%</a:t>
+            </a:r>
+            <a:r>
+              <a:rPr sz="1800">
+                <a:solidFill>
+                  <a:srgbClr val="4070A0"/>
+                </a:solidFill>
+                <a:latin typeface="Courier"/>
+              </a:rPr>
+              <a:t> </a:t>
+            </a:r>
+            <a:r>
+              <a:rPr sz="1800" i="1">
+                <a:solidFill>
+                  <a:srgbClr val="60A0B0"/>
+                </a:solidFill>
+                <a:latin typeface="Courier"/>
+              </a:rPr>
+              <a:t>#selecionando as variaveis de interesse - nome do estado, ano da constituição, constituição atual e total de palavras</a:t>
+            </a:r>
+            <a:br/>
+            <a:r>
+              <a:rPr sz="1800">
+                <a:solidFill>
+                  <a:srgbClr val="4070A0"/>
+                </a:solidFill>
+                <a:latin typeface="Courier"/>
+              </a:rPr>
+              <a:t>  </a:t>
+            </a:r>
+            <a:r>
+              <a:rPr sz="1800" b="1">
+                <a:solidFill>
+                  <a:srgbClr val="007020"/>
+                </a:solidFill>
+                <a:latin typeface="Courier"/>
+              </a:rPr>
+              <a:t>filter</a:t>
+            </a:r>
+            <a:r>
+              <a:rPr sz="1800">
+                <a:latin typeface="Courier"/>
+              </a:rPr>
+              <a:t>(current_constitution </a:t>
+            </a:r>
+            <a:r>
+              <a:rPr sz="1800">
+                <a:solidFill>
+                  <a:srgbClr val="666666"/>
+                </a:solidFill>
+                <a:latin typeface="Courier"/>
+              </a:rPr>
+              <a:t>==</a:t>
+            </a:r>
+            <a:r>
+              <a:rPr sz="1800">
+                <a:solidFill>
+                  <a:srgbClr val="4070A0"/>
+                </a:solidFill>
+                <a:latin typeface="Courier"/>
+              </a:rPr>
+              <a:t> </a:t>
+            </a:r>
+            <a:r>
+              <a:rPr sz="1800">
+                <a:solidFill>
+                  <a:srgbClr val="40A070"/>
+                </a:solidFill>
+                <a:latin typeface="Courier"/>
+              </a:rPr>
+              <a:t>1</a:t>
+            </a:r>
+            <a:r>
+              <a:rPr sz="1800">
+                <a:latin typeface="Courier"/>
+              </a:rPr>
+              <a:t>) </a:t>
+            </a:r>
+            <a:r>
+              <a:rPr sz="1800" i="1">
+                <a:solidFill>
+                  <a:srgbClr val="60A0B0"/>
+                </a:solidFill>
+                <a:latin typeface="Courier"/>
+              </a:rPr>
+              <a:t>#filtrando apenas as constituições vigentes</a:t>
             </a:r>
           </a:p>
         </p:txBody>
@@ -4694,15 +6877,31 @@
             </a:pPr>
             <a:r>
               <a:rPr/>
-              <a:t>Preparando</a:t>
-            </a:r>
-            <a:r>
-              <a:rPr/>
-              <a:t> </a:t>
-            </a:r>
-            <a:r>
-              <a:rPr/>
-              <a:t>os</a:t>
+              <a:t>Visualizando</a:t>
+            </a:r>
+            <a:r>
+              <a:rPr/>
+              <a:t> </a:t>
+            </a:r>
+            <a:r>
+              <a:rPr/>
+              <a:t>a</a:t>
+            </a:r>
+            <a:r>
+              <a:rPr/>
+              <a:t> </a:t>
+            </a:r>
+            <a:r>
+              <a:rPr/>
+              <a:t>base</a:t>
+            </a:r>
+            <a:r>
+              <a:rPr/>
+              <a:t> </a:t>
+            </a:r>
+            <a:r>
+              <a:rPr/>
+              <a:t>de</a:t>
             </a:r>
             <a:r>
               <a:rPr/>
@@ -4718,23 +6917,15 @@
             </a:r>
             <a:r>
               <a:rPr/>
-              <a:t>para</a:t>
-            </a:r>
-            <a:r>
-              <a:rPr/>
-              <a:t> </a:t>
-            </a:r>
-            <a:r>
-              <a:rPr/>
-              <a:t>os</a:t>
-            </a:r>
-            <a:r>
-              <a:rPr/>
-              <a:t> </a:t>
-            </a:r>
-            <a:r>
-              <a:rPr/>
-              <a:t>gráficos</a:t>
+              <a:t>após</a:t>
+            </a:r>
+            <a:r>
+              <a:rPr/>
+              <a:t> </a:t>
+            </a:r>
+            <a:r>
+              <a:rPr/>
+              <a:t>manipulação</a:t>
             </a:r>
           </a:p>
         </p:txBody>
@@ -4754,10 +6945,23 @@
           <a:bodyPr/>
           <a:lstStyle/>
           <a:p>
-            <a:pPr lvl="1"/>
-            <a:r>
-              <a:rPr/>
-              <a:t>Criarei uma nova coluna (abv_state) a partir da base de dados (states_and_abbreviations) para usar as abreviação dos nomes dos estados e assim facilitar a visualização dos dados no gráfico.</a:t>
+            <a:pPr lvl="0" marL="1270000" indent="0">
+              <a:buNone/>
+            </a:pPr>
+            <a:r>
+              <a:rPr sz="1800" b="1">
+                <a:solidFill>
+                  <a:srgbClr val="007020"/>
+                </a:solidFill>
+                <a:latin typeface="Courier"/>
+              </a:rPr>
+              <a:t>View</a:t>
+            </a:r>
+            <a:r>
+              <a:rPr sz="1800">
+                <a:latin typeface="Courier"/>
+              </a:rPr>
+              <a:t>(state_constitutions_word_count)</a:t>
             </a:r>
           </a:p>
         </p:txBody>

</xml_diff>